<commit_message>
Adicionados os protótipos de tela
</commit_message>
<xml_diff>
--- a/docs/Trabalho-Final.pptx
+++ b/docs/Trabalho-Final.pptx
@@ -5,7 +5,7 @@
     <p:sldMasterId id="2147483972" r:id="rId1"/>
   </p:sldMasterIdLst>
   <p:notesMasterIdLst>
-    <p:notesMasterId r:id="rId12"/>
+    <p:notesMasterId r:id="rId16"/>
   </p:notesMasterIdLst>
   <p:sldIdLst>
     <p:sldId id="256" r:id="rId2"/>
@@ -13,11 +13,15 @@
     <p:sldId id="262" r:id="rId4"/>
     <p:sldId id="257" r:id="rId5"/>
     <p:sldId id="258" r:id="rId6"/>
-    <p:sldId id="264" r:id="rId7"/>
-    <p:sldId id="259" r:id="rId8"/>
-    <p:sldId id="265" r:id="rId9"/>
-    <p:sldId id="261" r:id="rId10"/>
-    <p:sldId id="260" r:id="rId11"/>
+    <p:sldId id="266" r:id="rId7"/>
+    <p:sldId id="267" r:id="rId8"/>
+    <p:sldId id="268" r:id="rId9"/>
+    <p:sldId id="269" r:id="rId10"/>
+    <p:sldId id="264" r:id="rId11"/>
+    <p:sldId id="259" r:id="rId12"/>
+    <p:sldId id="265" r:id="rId13"/>
+    <p:sldId id="261" r:id="rId14"/>
+    <p:sldId id="260" r:id="rId15"/>
   </p:sldIdLst>
   <p:sldSz cx="9144000" cy="6858000" type="screen4x3"/>
   <p:notesSz cx="6858000" cy="9144000"/>
@@ -201,7 +205,7 @@
           <a:p>
             <a:fld id="{70189321-DFDA-43F5-BCE8-1C18FB318627}" type="datetimeFigureOut">
               <a:rPr lang="en-US" smtClean="0"/>
-              <a:t>6/27/2013</a:t>
+              <a:t>7/19/2013</a:t>
             </a:fld>
             <a:endParaRPr lang="en-US"/>
           </a:p>
@@ -781,7 +785,7 @@
           <a:p>
             <a:fld id="{164AA0AC-6FA9-4431-92AA-FE6C8525E1A5}" type="slidenum">
               <a:rPr lang="en-US" smtClean="0"/>
-              <a:t>7</a:t>
+              <a:t>11</a:t>
             </a:fld>
             <a:endParaRPr lang="en-US"/>
           </a:p>
@@ -862,7 +866,7 @@
           <a:p>
             <a:fld id="{164AA0AC-6FA9-4431-92AA-FE6C8525E1A5}" type="slidenum">
               <a:rPr lang="en-US" smtClean="0"/>
-              <a:t>8</a:t>
+              <a:t>12</a:t>
             </a:fld>
             <a:endParaRPr lang="en-US"/>
           </a:p>
@@ -943,7 +947,7 @@
           <a:p>
             <a:fld id="{164AA0AC-6FA9-4431-92AA-FE6C8525E1A5}" type="slidenum">
               <a:rPr lang="en-US" smtClean="0"/>
-              <a:t>9</a:t>
+              <a:t>13</a:t>
             </a:fld>
             <a:endParaRPr lang="en-US"/>
           </a:p>
@@ -1024,7 +1028,7 @@
           <a:p>
             <a:fld id="{164AA0AC-6FA9-4431-92AA-FE6C8525E1A5}" type="slidenum">
               <a:rPr lang="en-US" smtClean="0"/>
-              <a:t>10</a:t>
+              <a:t>14</a:t>
             </a:fld>
             <a:endParaRPr lang="en-US"/>
           </a:p>
@@ -1696,7 +1700,7 @@
           <a:p>
             <a:fld id="{E4B07001-C032-4E44-8CAA-EF950BEDBEFC}" type="datetimeFigureOut">
               <a:rPr lang="en-US" smtClean="0"/>
-              <a:t>6/27/2013</a:t>
+              <a:t>7/19/2013</a:t>
             </a:fld>
             <a:endParaRPr lang="en-US"/>
           </a:p>
@@ -1879,7 +1883,7 @@
           <a:p>
             <a:fld id="{E4B07001-C032-4E44-8CAA-EF950BEDBEFC}" type="datetimeFigureOut">
               <a:rPr lang="en-US" smtClean="0"/>
-              <a:t>6/27/2013</a:t>
+              <a:t>7/19/2013</a:t>
             </a:fld>
             <a:endParaRPr lang="en-US"/>
           </a:p>
@@ -2054,7 +2058,7 @@
           <a:p>
             <a:fld id="{E4B07001-C032-4E44-8CAA-EF950BEDBEFC}" type="datetimeFigureOut">
               <a:rPr lang="en-US" smtClean="0"/>
-              <a:t>6/27/2013</a:t>
+              <a:t>7/19/2013</a:t>
             </a:fld>
             <a:endParaRPr lang="en-US"/>
           </a:p>
@@ -2219,7 +2223,7 @@
           <a:p>
             <a:fld id="{E4B07001-C032-4E44-8CAA-EF950BEDBEFC}" type="datetimeFigureOut">
               <a:rPr lang="en-US" smtClean="0"/>
-              <a:t>6/27/2013</a:t>
+              <a:t>7/19/2013</a:t>
             </a:fld>
             <a:endParaRPr lang="en-US"/>
           </a:p>
@@ -2440,7 +2444,7 @@
           <a:p>
             <a:fld id="{E4B07001-C032-4E44-8CAA-EF950BEDBEFC}" type="datetimeFigureOut">
               <a:rPr lang="en-US" smtClean="0"/>
-              <a:t>6/27/2013</a:t>
+              <a:t>7/19/2013</a:t>
             </a:fld>
             <a:endParaRPr lang="en-US"/>
           </a:p>
@@ -2699,7 +2703,7 @@
           <a:p>
             <a:fld id="{E4B07001-C032-4E44-8CAA-EF950BEDBEFC}" type="datetimeFigureOut">
               <a:rPr lang="en-US" smtClean="0"/>
-              <a:t>6/27/2013</a:t>
+              <a:t>7/19/2013</a:t>
             </a:fld>
             <a:endParaRPr lang="en-US"/>
           </a:p>
@@ -3103,7 +3107,7 @@
           <a:p>
             <a:fld id="{E4B07001-C032-4E44-8CAA-EF950BEDBEFC}" type="datetimeFigureOut">
               <a:rPr lang="en-US" smtClean="0"/>
-              <a:t>6/27/2013</a:t>
+              <a:t>7/19/2013</a:t>
             </a:fld>
             <a:endParaRPr lang="en-US"/>
           </a:p>
@@ -3234,7 +3238,7 @@
           <a:p>
             <a:fld id="{E4B07001-C032-4E44-8CAA-EF950BEDBEFC}" type="datetimeFigureOut">
               <a:rPr lang="en-US" smtClean="0"/>
-              <a:t>6/27/2013</a:t>
+              <a:t>7/19/2013</a:t>
             </a:fld>
             <a:endParaRPr lang="en-US"/>
           </a:p>
@@ -3334,7 +3338,7 @@
           <a:p>
             <a:fld id="{E4B07001-C032-4E44-8CAA-EF950BEDBEFC}" type="datetimeFigureOut">
               <a:rPr lang="en-US" smtClean="0"/>
-              <a:t>6/27/2013</a:t>
+              <a:t>7/19/2013</a:t>
             </a:fld>
             <a:endParaRPr lang="en-US"/>
           </a:p>
@@ -3579,7 +3583,7 @@
           <a:p>
             <a:fld id="{E4B07001-C032-4E44-8CAA-EF950BEDBEFC}" type="datetimeFigureOut">
               <a:rPr lang="en-US" smtClean="0"/>
-              <a:t>6/27/2013</a:t>
+              <a:t>7/19/2013</a:t>
             </a:fld>
             <a:endParaRPr lang="en-US"/>
           </a:p>
@@ -3823,7 +3827,7 @@
           <a:p>
             <a:fld id="{E4B07001-C032-4E44-8CAA-EF950BEDBEFC}" type="datetimeFigureOut">
               <a:rPr lang="en-US" smtClean="0"/>
-              <a:t>6/27/2013</a:t>
+              <a:t>7/19/2013</a:t>
             </a:fld>
             <a:endParaRPr lang="en-US"/>
           </a:p>
@@ -4647,7 +4651,7 @@
           <a:p>
             <a:fld id="{E4B07001-C032-4E44-8CAA-EF950BEDBEFC}" type="datetimeFigureOut">
               <a:rPr lang="en-US" smtClean="0"/>
-              <a:t>6/27/2013</a:t>
+              <a:t>7/19/2013</a:t>
             </a:fld>
             <a:endParaRPr lang="en-US"/>
           </a:p>
@@ -5161,6 +5165,616 @@
       </p:grpSpPr>
       <p:sp>
         <p:nvSpPr>
+          <p:cNvPr id="5" name="Título 4"/>
+          <p:cNvSpPr>
+            <a:spLocks noGrp="1"/>
+          </p:cNvSpPr>
+          <p:nvPr>
+            <p:ph type="title"/>
+          </p:nvPr>
+        </p:nvSpPr>
+        <p:spPr/>
+        <p:txBody>
+          <a:bodyPr/>
+          <a:lstStyle/>
+          <a:p>
+            <a:r>
+              <a:rPr lang="pt-BR" dirty="0" smtClean="0"/>
+              <a:t>Direcionamento</a:t>
+            </a:r>
+            <a:endParaRPr lang="pt-BR" dirty="0"/>
+          </a:p>
+        </p:txBody>
+      </p:sp>
+      <p:sp>
+        <p:nvSpPr>
+          <p:cNvPr id="6" name="Espaço Reservado para Texto 5"/>
+          <p:cNvSpPr>
+            <a:spLocks noGrp="1"/>
+          </p:cNvSpPr>
+          <p:nvPr>
+            <p:ph type="body" idx="1"/>
+          </p:nvPr>
+        </p:nvSpPr>
+        <p:spPr/>
+        <p:txBody>
+          <a:bodyPr/>
+          <a:lstStyle/>
+          <a:p>
+            <a:endParaRPr lang="pt-BR"/>
+          </a:p>
+        </p:txBody>
+      </p:sp>
+    </p:spTree>
+    <p:extLst>
+      <p:ext uri="{BB962C8B-B14F-4D97-AF65-F5344CB8AC3E}">
+        <p14:creationId xmlns:p14="http://schemas.microsoft.com/office/powerpoint/2010/main" val="22330388"/>
+      </p:ext>
+    </p:extLst>
+  </p:cSld>
+  <p:clrMapOvr>
+    <a:masterClrMapping/>
+  </p:clrMapOvr>
+  <p:timing>
+    <p:tnLst>
+      <p:par>
+        <p:cTn id="1" dur="indefinite" restart="never" nodeType="tmRoot"/>
+      </p:par>
+    </p:tnLst>
+  </p:timing>
+</p:sld>
+</file>
+
+<file path=ppt/slides/slide11.xml><?xml version="1.0" encoding="utf-8"?>
+<p:sld xmlns:a="http://schemas.openxmlformats.org/drawingml/2006/main" xmlns:r="http://schemas.openxmlformats.org/officeDocument/2006/relationships" xmlns:p="http://schemas.openxmlformats.org/presentationml/2006/main">
+  <p:cSld>
+    <p:spTree>
+      <p:nvGrpSpPr>
+        <p:cNvPr id="1" name=""/>
+        <p:cNvGrpSpPr/>
+        <p:nvPr/>
+      </p:nvGrpSpPr>
+      <p:grpSpPr>
+        <a:xfrm>
+          <a:off x="0" y="0"/>
+          <a:ext cx="0" cy="0"/>
+          <a:chOff x="0" y="0"/>
+          <a:chExt cx="0" cy="0"/>
+        </a:xfrm>
+      </p:grpSpPr>
+      <p:sp>
+        <p:nvSpPr>
+          <p:cNvPr id="2" name="Título 1"/>
+          <p:cNvSpPr>
+            <a:spLocks noGrp="1"/>
+          </p:cNvSpPr>
+          <p:nvPr>
+            <p:ph type="title"/>
+          </p:nvPr>
+        </p:nvSpPr>
+        <p:spPr/>
+        <p:txBody>
+          <a:bodyPr>
+            <a:normAutofit/>
+          </a:bodyPr>
+          <a:lstStyle/>
+          <a:p>
+            <a:r>
+              <a:rPr lang="pt-BR" dirty="0" smtClean="0"/>
+              <a:t>Padrões de Projeto</a:t>
+            </a:r>
+            <a:endParaRPr lang="en-US" dirty="0"/>
+          </a:p>
+        </p:txBody>
+      </p:sp>
+      <p:sp>
+        <p:nvSpPr>
+          <p:cNvPr id="5" name="Espaço Reservado para Conteúdo 4"/>
+          <p:cNvSpPr>
+            <a:spLocks noGrp="1"/>
+          </p:cNvSpPr>
+          <p:nvPr>
+            <p:ph idx="1"/>
+          </p:nvPr>
+        </p:nvSpPr>
+        <p:spPr/>
+        <p:txBody>
+          <a:bodyPr>
+            <a:normAutofit fontScale="77500" lnSpcReduction="20000"/>
+          </a:bodyPr>
+          <a:lstStyle/>
+          <a:p>
+            <a:r>
+              <a:rPr lang="pt-BR" b="1" dirty="0" smtClean="0">
+                <a:solidFill>
+                  <a:srgbClr val="0070C0"/>
+                </a:solidFill>
+              </a:rPr>
+              <a:t>MVC – </a:t>
+            </a:r>
+            <a:r>
+              <a:rPr lang="pt-BR" b="1" dirty="0" err="1" smtClean="0">
+                <a:solidFill>
+                  <a:srgbClr val="0070C0"/>
+                </a:solidFill>
+              </a:rPr>
+              <a:t>Model</a:t>
+            </a:r>
+            <a:r>
+              <a:rPr lang="pt-BR" b="1" dirty="0" smtClean="0">
+                <a:solidFill>
+                  <a:srgbClr val="0070C0"/>
+                </a:solidFill>
+              </a:rPr>
+              <a:t>, </a:t>
+            </a:r>
+            <a:r>
+              <a:rPr lang="pt-BR" b="1" dirty="0" err="1" smtClean="0">
+                <a:solidFill>
+                  <a:srgbClr val="0070C0"/>
+                </a:solidFill>
+              </a:rPr>
+              <a:t>View</a:t>
+            </a:r>
+            <a:r>
+              <a:rPr lang="pt-BR" b="1" dirty="0" smtClean="0">
+                <a:solidFill>
+                  <a:srgbClr val="0070C0"/>
+                </a:solidFill>
+              </a:rPr>
+              <a:t>, </a:t>
+            </a:r>
+            <a:r>
+              <a:rPr lang="pt-BR" b="1" dirty="0" err="1" smtClean="0">
+                <a:solidFill>
+                  <a:srgbClr val="0070C0"/>
+                </a:solidFill>
+              </a:rPr>
+              <a:t>Controler</a:t>
+            </a:r>
+            <a:endParaRPr lang="pt-BR" b="1" dirty="0" smtClean="0">
+              <a:solidFill>
+                <a:srgbClr val="0070C0"/>
+              </a:solidFill>
+            </a:endParaRPr>
+          </a:p>
+          <a:p>
+            <a:pPr lvl="1"/>
+            <a:r>
+              <a:rPr lang="pt-BR" dirty="0" smtClean="0"/>
+              <a:t>Modelos:</a:t>
+            </a:r>
+          </a:p>
+          <a:p>
+            <a:pPr lvl="2"/>
+            <a:r>
+              <a:rPr lang="pt-BR" dirty="0" smtClean="0"/>
+              <a:t>Situação</a:t>
+            </a:r>
+          </a:p>
+          <a:p>
+            <a:pPr lvl="2"/>
+            <a:r>
+              <a:rPr lang="pt-BR" dirty="0" smtClean="0"/>
+              <a:t>Tarefa</a:t>
+            </a:r>
+          </a:p>
+          <a:p>
+            <a:pPr lvl="2"/>
+            <a:r>
+              <a:rPr lang="pt-BR" dirty="0" smtClean="0"/>
+              <a:t>Projeto</a:t>
+            </a:r>
+          </a:p>
+          <a:p>
+            <a:endParaRPr lang="pt-BR" dirty="0"/>
+          </a:p>
+          <a:p>
+            <a:r>
+              <a:rPr lang="pt-BR" b="1" dirty="0" err="1" smtClean="0">
+                <a:solidFill>
+                  <a:srgbClr val="0070C0"/>
+                </a:solidFill>
+              </a:rPr>
+              <a:t>Service</a:t>
+            </a:r>
+            <a:endParaRPr lang="pt-BR" b="1" dirty="0" smtClean="0">
+              <a:solidFill>
+                <a:srgbClr val="0070C0"/>
+              </a:solidFill>
+            </a:endParaRPr>
+          </a:p>
+          <a:p>
+            <a:pPr lvl="1"/>
+            <a:r>
+              <a:rPr lang="pt-BR" dirty="0" err="1" smtClean="0"/>
+              <a:t>ArquivoService</a:t>
+            </a:r>
+            <a:r>
+              <a:rPr lang="pt-BR" dirty="0" smtClean="0"/>
+              <a:t>: salvar, recarregar</a:t>
+            </a:r>
+          </a:p>
+          <a:p>
+            <a:endParaRPr lang="pt-BR" dirty="0" smtClean="0"/>
+          </a:p>
+          <a:p>
+            <a:r>
+              <a:rPr lang="pt-BR" b="1" dirty="0" err="1" smtClean="0">
+                <a:solidFill>
+                  <a:srgbClr val="0070C0"/>
+                </a:solidFill>
+              </a:rPr>
+              <a:t>Singleton</a:t>
+            </a:r>
+            <a:endParaRPr lang="pt-BR" b="1" dirty="0" smtClean="0">
+              <a:solidFill>
+                <a:srgbClr val="0070C0"/>
+              </a:solidFill>
+            </a:endParaRPr>
+          </a:p>
+          <a:p>
+            <a:pPr lvl="1"/>
+            <a:r>
+              <a:rPr lang="pt-BR" dirty="0" err="1" smtClean="0"/>
+              <a:t>BancoDeDados</a:t>
+            </a:r>
+            <a:endParaRPr lang="pt-BR" dirty="0" smtClean="0"/>
+          </a:p>
+          <a:p>
+            <a:pPr lvl="1"/>
+            <a:endParaRPr lang="pt-BR" dirty="0"/>
+          </a:p>
+          <a:p>
+            <a:r>
+              <a:rPr lang="pt-BR" b="1" dirty="0" err="1" smtClean="0">
+                <a:solidFill>
+                  <a:srgbClr val="0070C0"/>
+                </a:solidFill>
+              </a:rPr>
+              <a:t>Factory</a:t>
+            </a:r>
+            <a:endParaRPr lang="pt-BR" b="1" dirty="0" smtClean="0">
+              <a:solidFill>
+                <a:srgbClr val="0070C0"/>
+              </a:solidFill>
+            </a:endParaRPr>
+          </a:p>
+          <a:p>
+            <a:pPr lvl="1"/>
+            <a:r>
+              <a:rPr lang="pt-BR" dirty="0" smtClean="0"/>
+              <a:t>Telas</a:t>
+            </a:r>
+          </a:p>
+          <a:p>
+            <a:pPr lvl="1"/>
+            <a:endParaRPr lang="pt-BR" dirty="0"/>
+          </a:p>
+          <a:p>
+            <a:endParaRPr lang="pt-BR" dirty="0"/>
+          </a:p>
+          <a:p>
+            <a:endParaRPr lang="en-US" dirty="0"/>
+          </a:p>
+        </p:txBody>
+      </p:sp>
+    </p:spTree>
+  </p:cSld>
+  <p:clrMapOvr>
+    <a:masterClrMapping/>
+  </p:clrMapOvr>
+  <p:timing>
+    <p:tnLst>
+      <p:par>
+        <p:cTn id="1" dur="indefinite" restart="never" nodeType="tmRoot"/>
+      </p:par>
+    </p:tnLst>
+  </p:timing>
+</p:sld>
+</file>
+
+<file path=ppt/slides/slide12.xml><?xml version="1.0" encoding="utf-8"?>
+<p:sld xmlns:a="http://schemas.openxmlformats.org/drawingml/2006/main" xmlns:r="http://schemas.openxmlformats.org/officeDocument/2006/relationships" xmlns:p="http://schemas.openxmlformats.org/presentationml/2006/main">
+  <p:cSld>
+    <p:spTree>
+      <p:nvGrpSpPr>
+        <p:cNvPr id="1" name=""/>
+        <p:cNvGrpSpPr/>
+        <p:nvPr/>
+      </p:nvGrpSpPr>
+      <p:grpSpPr>
+        <a:xfrm>
+          <a:off x="0" y="0"/>
+          <a:ext cx="0" cy="0"/>
+          <a:chOff x="0" y="0"/>
+          <a:chExt cx="0" cy="0"/>
+        </a:xfrm>
+      </p:grpSpPr>
+      <p:sp>
+        <p:nvSpPr>
+          <p:cNvPr id="2" name="Título 1"/>
+          <p:cNvSpPr>
+            <a:spLocks noGrp="1"/>
+          </p:cNvSpPr>
+          <p:nvPr>
+            <p:ph type="title"/>
+          </p:nvPr>
+        </p:nvSpPr>
+        <p:spPr/>
+        <p:txBody>
+          <a:bodyPr>
+            <a:normAutofit/>
+          </a:bodyPr>
+          <a:lstStyle/>
+          <a:p>
+            <a:r>
+              <a:rPr lang="pt-BR" dirty="0" smtClean="0"/>
+              <a:t>Padrões de Projeto</a:t>
+            </a:r>
+            <a:endParaRPr lang="en-US" dirty="0"/>
+          </a:p>
+        </p:txBody>
+      </p:sp>
+      <p:sp>
+        <p:nvSpPr>
+          <p:cNvPr id="5" name="Espaço Reservado para Conteúdo 4"/>
+          <p:cNvSpPr>
+            <a:spLocks noGrp="1"/>
+          </p:cNvSpPr>
+          <p:nvPr>
+            <p:ph idx="1"/>
+          </p:nvPr>
+        </p:nvSpPr>
+        <p:spPr/>
+        <p:txBody>
+          <a:bodyPr>
+            <a:normAutofit/>
+          </a:bodyPr>
+          <a:lstStyle/>
+          <a:p>
+            <a:r>
+              <a:rPr lang="pt-BR" b="1" dirty="0" err="1" smtClean="0">
+                <a:solidFill>
+                  <a:srgbClr val="0070C0"/>
+                </a:solidFill>
+              </a:rPr>
+              <a:t>Strategy</a:t>
+            </a:r>
+            <a:endParaRPr lang="pt-BR" b="1" dirty="0">
+              <a:solidFill>
+                <a:srgbClr val="0070C0"/>
+              </a:solidFill>
+            </a:endParaRPr>
+          </a:p>
+          <a:p>
+            <a:pPr lvl="1"/>
+            <a:r>
+              <a:rPr lang="pt-BR" dirty="0" smtClean="0"/>
+              <a:t>Ordenação das tarefas:</a:t>
+            </a:r>
+            <a:endParaRPr lang="pt-BR" dirty="0"/>
+          </a:p>
+          <a:p>
+            <a:pPr lvl="2"/>
+            <a:r>
+              <a:rPr lang="pt-BR" dirty="0" smtClean="0"/>
+              <a:t>Implementar um algoritmo de ordenação</a:t>
+            </a:r>
+          </a:p>
+          <a:p>
+            <a:pPr lvl="2"/>
+            <a:r>
+              <a:rPr lang="pt-BR" dirty="0" smtClean="0"/>
+              <a:t>Usar o </a:t>
+            </a:r>
+            <a:r>
+              <a:rPr lang="pt-BR" dirty="0" err="1" smtClean="0"/>
+              <a:t>Quicksort</a:t>
+            </a:r>
+            <a:endParaRPr lang="pt-BR" dirty="0"/>
+          </a:p>
+          <a:p>
+            <a:pPr lvl="1"/>
+            <a:endParaRPr lang="pt-BR" dirty="0"/>
+          </a:p>
+          <a:p>
+            <a:endParaRPr lang="pt-BR" dirty="0"/>
+          </a:p>
+          <a:p>
+            <a:endParaRPr lang="en-US" dirty="0"/>
+          </a:p>
+        </p:txBody>
+      </p:sp>
+    </p:spTree>
+    <p:extLst>
+      <p:ext uri="{BB962C8B-B14F-4D97-AF65-F5344CB8AC3E}">
+        <p14:creationId xmlns:p14="http://schemas.microsoft.com/office/powerpoint/2010/main" val="2545713470"/>
+      </p:ext>
+    </p:extLst>
+  </p:cSld>
+  <p:clrMapOvr>
+    <a:masterClrMapping/>
+  </p:clrMapOvr>
+  <p:timing>
+    <p:tnLst>
+      <p:par>
+        <p:cTn id="1" dur="indefinite" restart="never" nodeType="tmRoot"/>
+      </p:par>
+    </p:tnLst>
+  </p:timing>
+</p:sld>
+</file>
+
+<file path=ppt/slides/slide13.xml><?xml version="1.0" encoding="utf-8"?>
+<p:sld xmlns:a="http://schemas.openxmlformats.org/drawingml/2006/main" xmlns:r="http://schemas.openxmlformats.org/officeDocument/2006/relationships" xmlns:p="http://schemas.openxmlformats.org/presentationml/2006/main">
+  <p:cSld>
+    <p:spTree>
+      <p:nvGrpSpPr>
+        <p:cNvPr id="1" name=""/>
+        <p:cNvGrpSpPr/>
+        <p:nvPr/>
+      </p:nvGrpSpPr>
+      <p:grpSpPr>
+        <a:xfrm>
+          <a:off x="0" y="0"/>
+          <a:ext cx="0" cy="0"/>
+          <a:chOff x="0" y="0"/>
+          <a:chExt cx="0" cy="0"/>
+        </a:xfrm>
+      </p:grpSpPr>
+      <p:sp>
+        <p:nvSpPr>
+          <p:cNvPr id="2" name="Título 1"/>
+          <p:cNvSpPr>
+            <a:spLocks noGrp="1"/>
+          </p:cNvSpPr>
+          <p:nvPr>
+            <p:ph type="title"/>
+          </p:nvPr>
+        </p:nvSpPr>
+        <p:spPr/>
+        <p:txBody>
+          <a:bodyPr/>
+          <a:lstStyle/>
+          <a:p>
+            <a:r>
+              <a:rPr lang="pt-BR" dirty="0" smtClean="0"/>
+              <a:t>Principais Interfaces</a:t>
+            </a:r>
+            <a:endParaRPr lang="en-US" dirty="0"/>
+          </a:p>
+        </p:txBody>
+      </p:sp>
+      <p:sp>
+        <p:nvSpPr>
+          <p:cNvPr id="3" name="Espaço Reservado para Conteúdo 2"/>
+          <p:cNvSpPr>
+            <a:spLocks noGrp="1"/>
+          </p:cNvSpPr>
+          <p:nvPr>
+            <p:ph idx="1"/>
+          </p:nvPr>
+        </p:nvSpPr>
+        <p:spPr/>
+        <p:txBody>
+          <a:bodyPr>
+            <a:normAutofit/>
+          </a:bodyPr>
+          <a:lstStyle/>
+          <a:p>
+            <a:r>
+              <a:rPr lang="pt-BR" b="1" dirty="0" err="1" smtClean="0">
+                <a:solidFill>
+                  <a:srgbClr val="0070C0"/>
+                </a:solidFill>
+              </a:rPr>
+              <a:t>Comparable</a:t>
+            </a:r>
+            <a:endParaRPr lang="pt-BR" b="1" u="sng" dirty="0" smtClean="0">
+              <a:solidFill>
+                <a:srgbClr val="0070C0"/>
+              </a:solidFill>
+            </a:endParaRPr>
+          </a:p>
+          <a:p>
+            <a:pPr lvl="1"/>
+            <a:r>
+              <a:rPr lang="pt-BR" dirty="0" smtClean="0"/>
+              <a:t>Projeto</a:t>
+            </a:r>
+          </a:p>
+          <a:p>
+            <a:pPr lvl="1"/>
+            <a:r>
+              <a:rPr lang="pt-BR" dirty="0" smtClean="0"/>
+              <a:t>Tarefa</a:t>
+            </a:r>
+          </a:p>
+          <a:p>
+            <a:pPr lvl="1"/>
+            <a:r>
+              <a:rPr lang="pt-BR" dirty="0" smtClean="0"/>
+              <a:t>Situação</a:t>
+            </a:r>
+          </a:p>
+          <a:p>
+            <a:pPr lvl="1"/>
+            <a:endParaRPr lang="pt-BR" dirty="0"/>
+          </a:p>
+          <a:p>
+            <a:r>
+              <a:rPr lang="pt-BR" b="1" dirty="0" err="1" smtClean="0">
+                <a:solidFill>
+                  <a:srgbClr val="0070C0"/>
+                </a:solidFill>
+              </a:rPr>
+              <a:t>Serializable</a:t>
+            </a:r>
+            <a:endParaRPr lang="pt-BR" b="1" dirty="0" smtClean="0">
+              <a:solidFill>
+                <a:srgbClr val="0070C0"/>
+              </a:solidFill>
+            </a:endParaRPr>
+          </a:p>
+          <a:p>
+            <a:pPr lvl="1"/>
+            <a:r>
+              <a:rPr lang="pt-BR" dirty="0" smtClean="0"/>
+              <a:t>Projeto</a:t>
+            </a:r>
+          </a:p>
+          <a:p>
+            <a:pPr lvl="1"/>
+            <a:r>
+              <a:rPr lang="pt-BR" dirty="0" smtClean="0"/>
+              <a:t>Tarefa</a:t>
+            </a:r>
+          </a:p>
+          <a:p>
+            <a:pPr lvl="1"/>
+            <a:r>
+              <a:rPr lang="pt-BR" dirty="0" smtClean="0"/>
+              <a:t>Situação</a:t>
+            </a:r>
+            <a:endParaRPr lang="en-US" dirty="0"/>
+          </a:p>
+        </p:txBody>
+      </p:sp>
+    </p:spTree>
+  </p:cSld>
+  <p:clrMapOvr>
+    <a:masterClrMapping/>
+  </p:clrMapOvr>
+  <p:timing>
+    <p:tnLst>
+      <p:par>
+        <p:cTn id="1" dur="indefinite" restart="never" nodeType="tmRoot"/>
+      </p:par>
+    </p:tnLst>
+  </p:timing>
+</p:sld>
+</file>
+
+<file path=ppt/slides/slide14.xml><?xml version="1.0" encoding="utf-8"?>
+<p:sld xmlns:a="http://schemas.openxmlformats.org/drawingml/2006/main" xmlns:r="http://schemas.openxmlformats.org/officeDocument/2006/relationships" xmlns:p="http://schemas.openxmlformats.org/presentationml/2006/main">
+  <p:cSld>
+    <p:spTree>
+      <p:nvGrpSpPr>
+        <p:cNvPr id="1" name=""/>
+        <p:cNvGrpSpPr/>
+        <p:nvPr/>
+      </p:nvGrpSpPr>
+      <p:grpSpPr>
+        <a:xfrm>
+          <a:off x="0" y="0"/>
+          <a:ext cx="0" cy="0"/>
+          <a:chOff x="0" y="0"/>
+          <a:chExt cx="0" cy="0"/>
+        </a:xfrm>
+      </p:grpSpPr>
+      <p:sp>
+        <p:nvSpPr>
           <p:cNvPr id="2" name="Título 1"/>
           <p:cNvSpPr>
             <a:spLocks noGrp="1"/>
@@ -5838,11 +6452,7 @@
             </a:r>
             <a:r>
               <a:rPr lang="pt-BR" dirty="0" smtClean="0"/>
-              <a:t> arquivo ao abrir </a:t>
-            </a:r>
-            <a:r>
-              <a:rPr lang="pt-BR" dirty="0" smtClean="0"/>
-              <a:t>programa</a:t>
+              <a:t> arquivo ao abrir programa</a:t>
             </a:r>
           </a:p>
           <a:p>
@@ -5925,7 +6535,7 @@
           <a:p>
             <a:r>
               <a:rPr lang="pt-BR" dirty="0" smtClean="0"/>
-              <a:t>Direcionamento</a:t>
+              <a:t>Telas</a:t>
             </a:r>
             <a:endParaRPr lang="pt-BR" dirty="0"/>
           </a:p>
@@ -5946,27 +6556,20 @@
           <a:bodyPr/>
           <a:lstStyle/>
           <a:p>
-            <a:endParaRPr lang="pt-BR"/>
+            <a:endParaRPr lang="pt-BR" dirty="0"/>
           </a:p>
         </p:txBody>
       </p:sp>
     </p:spTree>
     <p:extLst>
       <p:ext uri="{BB962C8B-B14F-4D97-AF65-F5344CB8AC3E}">
-        <p14:creationId xmlns:p14="http://schemas.microsoft.com/office/powerpoint/2010/main" val="22330388"/>
+        <p14:creationId xmlns:p14="http://schemas.microsoft.com/office/powerpoint/2010/main" val="2119493802"/>
       </p:ext>
     </p:extLst>
   </p:cSld>
   <p:clrMapOvr>
     <a:masterClrMapping/>
   </p:clrMapOvr>
-  <p:timing>
-    <p:tnLst>
-      <p:par>
-        <p:cTn id="1" dur="indefinite" restart="never" nodeType="tmRoot"/>
-      </p:par>
-    </p:tnLst>
-  </p:timing>
 </p:sld>
 </file>
 
@@ -5989,7 +6592,7 @@
       </p:grpSpPr>
       <p:sp>
         <p:nvSpPr>
-          <p:cNvPr id="2" name="Título 1"/>
+          <p:cNvPr id="5" name="Título 4"/>
           <p:cNvSpPr>
             <a:spLocks noGrp="1"/>
           </p:cNvSpPr>
@@ -5999,223 +6602,499 @@
         </p:nvSpPr>
         <p:spPr/>
         <p:txBody>
-          <a:bodyPr>
-            <a:normAutofit/>
-          </a:bodyPr>
+          <a:bodyPr/>
           <a:lstStyle/>
           <a:p>
             <a:r>
               <a:rPr lang="pt-BR" dirty="0" smtClean="0"/>
-              <a:t>Padrões de Projeto</a:t>
-            </a:r>
-            <a:endParaRPr lang="en-US" dirty="0"/>
-          </a:p>
-        </p:txBody>
-      </p:sp>
-      <p:sp>
-        <p:nvSpPr>
-          <p:cNvPr id="5" name="Espaço Reservado para Conteúdo 4"/>
-          <p:cNvSpPr>
-            <a:spLocks noGrp="1"/>
-          </p:cNvSpPr>
-          <p:nvPr>
-            <p:ph idx="1"/>
-          </p:nvPr>
-        </p:nvSpPr>
-        <p:spPr/>
-        <p:txBody>
-          <a:bodyPr>
-            <a:normAutofit fontScale="77500" lnSpcReduction="20000"/>
-          </a:bodyPr>
-          <a:lstStyle/>
-          <a:p>
-            <a:r>
-              <a:rPr lang="pt-BR" b="1" dirty="0" smtClean="0">
-                <a:solidFill>
-                  <a:srgbClr val="0070C0"/>
-                </a:solidFill>
-              </a:rPr>
-              <a:t>MVC – </a:t>
-            </a:r>
-            <a:r>
-              <a:rPr lang="pt-BR" b="1" dirty="0" err="1" smtClean="0">
-                <a:solidFill>
-                  <a:srgbClr val="0070C0"/>
-                </a:solidFill>
-              </a:rPr>
-              <a:t>Model</a:t>
-            </a:r>
-            <a:r>
-              <a:rPr lang="pt-BR" b="1" dirty="0" smtClean="0">
-                <a:solidFill>
-                  <a:srgbClr val="0070C0"/>
-                </a:solidFill>
-              </a:rPr>
-              <a:t>, </a:t>
-            </a:r>
-            <a:r>
-              <a:rPr lang="pt-BR" b="1" dirty="0" err="1" smtClean="0">
-                <a:solidFill>
-                  <a:srgbClr val="0070C0"/>
-                </a:solidFill>
-              </a:rPr>
-              <a:t>View</a:t>
-            </a:r>
-            <a:r>
-              <a:rPr lang="pt-BR" b="1" dirty="0" smtClean="0">
-                <a:solidFill>
-                  <a:srgbClr val="0070C0"/>
-                </a:solidFill>
-              </a:rPr>
-              <a:t>, </a:t>
-            </a:r>
-            <a:r>
-              <a:rPr lang="pt-BR" b="1" dirty="0" err="1" smtClean="0">
-                <a:solidFill>
-                  <a:srgbClr val="0070C0"/>
-                </a:solidFill>
-              </a:rPr>
-              <a:t>Controler</a:t>
-            </a:r>
-            <a:endParaRPr lang="pt-BR" b="1" dirty="0" smtClean="0">
-              <a:solidFill>
-                <a:srgbClr val="0070C0"/>
-              </a:solidFill>
-            </a:endParaRPr>
-          </a:p>
-          <a:p>
-            <a:pPr lvl="1"/>
+              <a:t>Listagem de projetos</a:t>
+            </a:r>
+            <a:endParaRPr lang="pt-BR" dirty="0"/>
+          </a:p>
+        </p:txBody>
+      </p:sp>
+      <p:sp>
+        <p:nvSpPr>
+          <p:cNvPr id="6" name="Retângulo 5"/>
+          <p:cNvSpPr/>
+          <p:nvPr/>
+        </p:nvSpPr>
+        <p:spPr>
+          <a:xfrm>
+            <a:off x="611560" y="2492896"/>
+            <a:ext cx="8208912" cy="4032448"/>
+          </a:xfrm>
+          <a:prstGeom prst="rect">
+            <a:avLst/>
+          </a:prstGeom>
+        </p:spPr>
+        <p:style>
+          <a:lnRef idx="1">
+            <a:schemeClr val="dk1"/>
+          </a:lnRef>
+          <a:fillRef idx="2">
+            <a:schemeClr val="dk1"/>
+          </a:fillRef>
+          <a:effectRef idx="1">
+            <a:schemeClr val="dk1"/>
+          </a:effectRef>
+          <a:fontRef idx="minor">
+            <a:schemeClr val="dk1"/>
+          </a:fontRef>
+        </p:style>
+        <p:txBody>
+          <a:bodyPr rtlCol="0" anchor="ctr"/>
+          <a:lstStyle/>
+          <a:p>
+            <a:pPr algn="ctr"/>
+            <a:endParaRPr lang="pt-BR"/>
+          </a:p>
+        </p:txBody>
+      </p:sp>
+      <p:sp>
+        <p:nvSpPr>
+          <p:cNvPr id="7" name="Retângulo 6"/>
+          <p:cNvSpPr/>
+          <p:nvPr/>
+        </p:nvSpPr>
+        <p:spPr>
+          <a:xfrm>
+            <a:off x="971600" y="3861048"/>
+            <a:ext cx="7488832" cy="2376264"/>
+          </a:xfrm>
+          <a:prstGeom prst="rect">
+            <a:avLst/>
+          </a:prstGeom>
+        </p:spPr>
+        <p:style>
+          <a:lnRef idx="1">
+            <a:schemeClr val="dk1"/>
+          </a:lnRef>
+          <a:fillRef idx="2">
+            <a:schemeClr val="dk1"/>
+          </a:fillRef>
+          <a:effectRef idx="1">
+            <a:schemeClr val="dk1"/>
+          </a:effectRef>
+          <a:fontRef idx="minor">
+            <a:schemeClr val="dk1"/>
+          </a:fontRef>
+        </p:style>
+        <p:txBody>
+          <a:bodyPr rtlCol="0" anchor="ctr"/>
+          <a:lstStyle/>
+          <a:p>
+            <a:pPr algn="ctr"/>
+            <a:endParaRPr lang="pt-BR"/>
+          </a:p>
+        </p:txBody>
+      </p:sp>
+      <p:graphicFrame>
+        <p:nvGraphicFramePr>
+          <p:cNvPr id="8" name="Tabela 7"/>
+          <p:cNvGraphicFramePr>
+            <a:graphicFrameLocks noGrp="1"/>
+          </p:cNvGraphicFramePr>
+          <p:nvPr>
+            <p:extLst>
+              <p:ext uri="{D42A27DB-BD31-4B8C-83A1-F6EECF244321}">
+                <p14:modId xmlns:p14="http://schemas.microsoft.com/office/powerpoint/2010/main" val="4290465882"/>
+              </p:ext>
+            </p:extLst>
+          </p:nvPr>
+        </p:nvGraphicFramePr>
+        <p:xfrm>
+          <a:off x="980162" y="3885634"/>
+          <a:ext cx="7480269" cy="2351679"/>
+        </p:xfrm>
+        <a:graphic>
+          <a:graphicData uri="http://schemas.openxmlformats.org/drawingml/2006/table">
+            <a:tbl>
+              <a:tblPr firstRow="1" bandRow="1">
+                <a:tableStyleId>{5C22544A-7EE6-4342-B048-85BDC9FD1C3A}</a:tableStyleId>
+              </a:tblPr>
+              <a:tblGrid>
+                <a:gridCol w="1503606"/>
+                <a:gridCol w="2232248"/>
+                <a:gridCol w="3744415"/>
+              </a:tblGrid>
+              <a:tr h="783893">
+                <a:tc>
+                  <a:txBody>
+                    <a:bodyPr/>
+                    <a:lstStyle/>
+                    <a:p>
+                      <a:pPr algn="ctr"/>
+                      <a:r>
+                        <a:rPr lang="pt-BR" dirty="0" smtClean="0"/>
+                        <a:t>Nome</a:t>
+                      </a:r>
+                      <a:endParaRPr lang="pt-BR" dirty="0"/>
+                    </a:p>
+                  </a:txBody>
+                  <a:tcPr/>
+                </a:tc>
+                <a:tc>
+                  <a:txBody>
+                    <a:bodyPr/>
+                    <a:lstStyle/>
+                    <a:p>
+                      <a:pPr algn="ctr"/>
+                      <a:r>
+                        <a:rPr lang="pt-BR" dirty="0" smtClean="0"/>
+                        <a:t>Descrição</a:t>
+                      </a:r>
+                      <a:endParaRPr lang="pt-BR" dirty="0"/>
+                    </a:p>
+                  </a:txBody>
+                  <a:tcPr/>
+                </a:tc>
+                <a:tc>
+                  <a:txBody>
+                    <a:bodyPr/>
+                    <a:lstStyle/>
+                    <a:p>
+                      <a:pPr algn="ctr"/>
+                      <a:r>
+                        <a:rPr lang="pt-BR" dirty="0" smtClean="0"/>
+                        <a:t>Ações</a:t>
+                      </a:r>
+                      <a:endParaRPr lang="pt-BR" dirty="0"/>
+                    </a:p>
+                  </a:txBody>
+                  <a:tcPr/>
+                </a:tc>
+              </a:tr>
+              <a:tr h="783893">
+                <a:tc>
+                  <a:txBody>
+                    <a:bodyPr/>
+                    <a:lstStyle/>
+                    <a:p>
+                      <a:endParaRPr lang="pt-BR"/>
+                    </a:p>
+                  </a:txBody>
+                  <a:tcPr/>
+                </a:tc>
+                <a:tc>
+                  <a:txBody>
+                    <a:bodyPr/>
+                    <a:lstStyle/>
+                    <a:p>
+                      <a:endParaRPr lang="pt-BR"/>
+                    </a:p>
+                  </a:txBody>
+                  <a:tcPr/>
+                </a:tc>
+                <a:tc>
+                  <a:txBody>
+                    <a:bodyPr/>
+                    <a:lstStyle/>
+                    <a:p>
+                      <a:endParaRPr lang="pt-BR"/>
+                    </a:p>
+                  </a:txBody>
+                  <a:tcPr/>
+                </a:tc>
+              </a:tr>
+              <a:tr h="783893">
+                <a:tc>
+                  <a:txBody>
+                    <a:bodyPr/>
+                    <a:lstStyle/>
+                    <a:p>
+                      <a:endParaRPr lang="pt-BR"/>
+                    </a:p>
+                  </a:txBody>
+                  <a:tcPr/>
+                </a:tc>
+                <a:tc>
+                  <a:txBody>
+                    <a:bodyPr/>
+                    <a:lstStyle/>
+                    <a:p>
+                      <a:endParaRPr lang="pt-BR"/>
+                    </a:p>
+                  </a:txBody>
+                  <a:tcPr/>
+                </a:tc>
+                <a:tc>
+                  <a:txBody>
+                    <a:bodyPr/>
+                    <a:lstStyle/>
+                    <a:p>
+                      <a:endParaRPr lang="pt-BR" dirty="0"/>
+                    </a:p>
+                  </a:txBody>
+                  <a:tcPr/>
+                </a:tc>
+              </a:tr>
+            </a:tbl>
+          </a:graphicData>
+        </a:graphic>
+      </p:graphicFrame>
+      <p:sp>
+        <p:nvSpPr>
+          <p:cNvPr id="9" name="Retângulo de cantos arredondados 8"/>
+          <p:cNvSpPr/>
+          <p:nvPr/>
+        </p:nvSpPr>
+        <p:spPr>
+          <a:xfrm>
+            <a:off x="4932040" y="4869160"/>
+            <a:ext cx="684076" cy="432048"/>
+          </a:xfrm>
+          <a:prstGeom prst="roundRect">
+            <a:avLst/>
+          </a:prstGeom>
+        </p:spPr>
+        <p:style>
+          <a:lnRef idx="1">
+            <a:schemeClr val="dk1"/>
+          </a:lnRef>
+          <a:fillRef idx="2">
+            <a:schemeClr val="dk1"/>
+          </a:fillRef>
+          <a:effectRef idx="1">
+            <a:schemeClr val="dk1"/>
+          </a:effectRef>
+          <a:fontRef idx="minor">
+            <a:schemeClr val="dk1"/>
+          </a:fontRef>
+        </p:style>
+        <p:txBody>
+          <a:bodyPr rtlCol="0" anchor="ctr"/>
+          <a:lstStyle/>
+          <a:p>
+            <a:pPr algn="ctr"/>
             <a:r>
               <a:rPr lang="pt-BR" dirty="0" smtClean="0"/>
-              <a:t>Modelos:</a:t>
-            </a:r>
-          </a:p>
-          <a:p>
-            <a:pPr lvl="2"/>
+              <a:t>Ver</a:t>
+            </a:r>
+            <a:endParaRPr lang="pt-BR" dirty="0"/>
+          </a:p>
+        </p:txBody>
+      </p:sp>
+      <p:sp>
+        <p:nvSpPr>
+          <p:cNvPr id="10" name="Retângulo de cantos arredondados 9"/>
+          <p:cNvSpPr/>
+          <p:nvPr/>
+        </p:nvSpPr>
+        <p:spPr>
+          <a:xfrm>
+            <a:off x="5826224" y="4869160"/>
+            <a:ext cx="906016" cy="432048"/>
+          </a:xfrm>
+          <a:prstGeom prst="roundRect">
+            <a:avLst/>
+          </a:prstGeom>
+        </p:spPr>
+        <p:style>
+          <a:lnRef idx="1">
+            <a:schemeClr val="dk1"/>
+          </a:lnRef>
+          <a:fillRef idx="2">
+            <a:schemeClr val="dk1"/>
+          </a:fillRef>
+          <a:effectRef idx="1">
+            <a:schemeClr val="dk1"/>
+          </a:effectRef>
+          <a:fontRef idx="minor">
+            <a:schemeClr val="dk1"/>
+          </a:fontRef>
+        </p:style>
+        <p:txBody>
+          <a:bodyPr rtlCol="0" anchor="ctr"/>
+          <a:lstStyle/>
+          <a:p>
+            <a:pPr algn="ctr"/>
             <a:r>
               <a:rPr lang="pt-BR" dirty="0" smtClean="0"/>
-              <a:t>Situação</a:t>
-            </a:r>
-          </a:p>
-          <a:p>
-            <a:pPr lvl="2"/>
+              <a:t>Editar</a:t>
+            </a:r>
+            <a:endParaRPr lang="pt-BR" dirty="0"/>
+          </a:p>
+        </p:txBody>
+      </p:sp>
+      <p:sp>
+        <p:nvSpPr>
+          <p:cNvPr id="11" name="Retângulo de cantos arredondados 10"/>
+          <p:cNvSpPr/>
+          <p:nvPr/>
+        </p:nvSpPr>
+        <p:spPr>
+          <a:xfrm>
+            <a:off x="6977816" y="4869160"/>
+            <a:ext cx="978559" cy="432048"/>
+          </a:xfrm>
+          <a:prstGeom prst="roundRect">
+            <a:avLst/>
+          </a:prstGeom>
+        </p:spPr>
+        <p:style>
+          <a:lnRef idx="1">
+            <a:schemeClr val="dk1"/>
+          </a:lnRef>
+          <a:fillRef idx="2">
+            <a:schemeClr val="dk1"/>
+          </a:fillRef>
+          <a:effectRef idx="1">
+            <a:schemeClr val="dk1"/>
+          </a:effectRef>
+          <a:fontRef idx="minor">
+            <a:schemeClr val="dk1"/>
+          </a:fontRef>
+        </p:style>
+        <p:txBody>
+          <a:bodyPr rtlCol="0" anchor="ctr"/>
+          <a:lstStyle/>
+          <a:p>
+            <a:pPr algn="ctr"/>
             <a:r>
               <a:rPr lang="pt-BR" dirty="0" smtClean="0"/>
-              <a:t>Tarefa</a:t>
-            </a:r>
-          </a:p>
-          <a:p>
-            <a:pPr lvl="2"/>
+              <a:t>Excluir</a:t>
+            </a:r>
+            <a:endParaRPr lang="pt-BR" dirty="0"/>
+          </a:p>
+        </p:txBody>
+      </p:sp>
+      <p:sp>
+        <p:nvSpPr>
+          <p:cNvPr id="12" name="Retângulo de cantos arredondados 11"/>
+          <p:cNvSpPr/>
+          <p:nvPr/>
+        </p:nvSpPr>
+        <p:spPr>
+          <a:xfrm>
+            <a:off x="4939355" y="5589240"/>
+            <a:ext cx="684076" cy="432048"/>
+          </a:xfrm>
+          <a:prstGeom prst="roundRect">
+            <a:avLst/>
+          </a:prstGeom>
+        </p:spPr>
+        <p:style>
+          <a:lnRef idx="1">
+            <a:schemeClr val="dk1"/>
+          </a:lnRef>
+          <a:fillRef idx="2">
+            <a:schemeClr val="dk1"/>
+          </a:fillRef>
+          <a:effectRef idx="1">
+            <a:schemeClr val="dk1"/>
+          </a:effectRef>
+          <a:fontRef idx="minor">
+            <a:schemeClr val="dk1"/>
+          </a:fontRef>
+        </p:style>
+        <p:txBody>
+          <a:bodyPr rtlCol="0" anchor="ctr"/>
+          <a:lstStyle/>
+          <a:p>
+            <a:pPr algn="ctr"/>
             <a:r>
               <a:rPr lang="pt-BR" dirty="0" smtClean="0"/>
-              <a:t>Projeto</a:t>
-            </a:r>
-          </a:p>
-          <a:p>
+              <a:t>Ver</a:t>
+            </a:r>
             <a:endParaRPr lang="pt-BR" dirty="0"/>
           </a:p>
-          <a:p>
-            <a:r>
-              <a:rPr lang="pt-BR" b="1" dirty="0" err="1" smtClean="0">
-                <a:solidFill>
-                  <a:srgbClr val="0070C0"/>
-                </a:solidFill>
-              </a:rPr>
-              <a:t>Service</a:t>
-            </a:r>
-            <a:endParaRPr lang="pt-BR" b="1" dirty="0" smtClean="0">
-              <a:solidFill>
-                <a:srgbClr val="0070C0"/>
-              </a:solidFill>
-            </a:endParaRPr>
-          </a:p>
-          <a:p>
-            <a:pPr lvl="1"/>
-            <a:r>
-              <a:rPr lang="pt-BR" dirty="0" err="1" smtClean="0"/>
-              <a:t>ArquivoService</a:t>
-            </a:r>
+        </p:txBody>
+      </p:sp>
+      <p:sp>
+        <p:nvSpPr>
+          <p:cNvPr id="13" name="Retângulo de cantos arredondados 12"/>
+          <p:cNvSpPr/>
+          <p:nvPr/>
+        </p:nvSpPr>
+        <p:spPr>
+          <a:xfrm>
+            <a:off x="5833539" y="5589240"/>
+            <a:ext cx="906016" cy="432048"/>
+          </a:xfrm>
+          <a:prstGeom prst="roundRect">
+            <a:avLst/>
+          </a:prstGeom>
+        </p:spPr>
+        <p:style>
+          <a:lnRef idx="1">
+            <a:schemeClr val="dk1"/>
+          </a:lnRef>
+          <a:fillRef idx="2">
+            <a:schemeClr val="dk1"/>
+          </a:fillRef>
+          <a:effectRef idx="1">
+            <a:schemeClr val="dk1"/>
+          </a:effectRef>
+          <a:fontRef idx="minor">
+            <a:schemeClr val="dk1"/>
+          </a:fontRef>
+        </p:style>
+        <p:txBody>
+          <a:bodyPr rtlCol="0" anchor="ctr"/>
+          <a:lstStyle/>
+          <a:p>
+            <a:pPr algn="ctr"/>
             <a:r>
               <a:rPr lang="pt-BR" dirty="0" smtClean="0"/>
-              <a:t>: salvar, recarregar</a:t>
-            </a:r>
-          </a:p>
-          <a:p>
-            <a:endParaRPr lang="pt-BR" dirty="0" smtClean="0"/>
-          </a:p>
-          <a:p>
-            <a:r>
-              <a:rPr lang="pt-BR" b="1" dirty="0" err="1" smtClean="0">
-                <a:solidFill>
-                  <a:srgbClr val="0070C0"/>
-                </a:solidFill>
-              </a:rPr>
-              <a:t>Singleton</a:t>
-            </a:r>
-            <a:endParaRPr lang="pt-BR" b="1" dirty="0" smtClean="0">
-              <a:solidFill>
-                <a:srgbClr val="0070C0"/>
-              </a:solidFill>
-            </a:endParaRPr>
-          </a:p>
-          <a:p>
-            <a:pPr lvl="1"/>
-            <a:r>
-              <a:rPr lang="pt-BR" dirty="0" err="1" smtClean="0"/>
-              <a:t>BancoDeDados</a:t>
-            </a:r>
-            <a:endParaRPr lang="pt-BR" dirty="0" smtClean="0"/>
-          </a:p>
-          <a:p>
-            <a:pPr lvl="1"/>
+              <a:t>Editar</a:t>
+            </a:r>
             <a:endParaRPr lang="pt-BR" dirty="0"/>
           </a:p>
-          <a:p>
-            <a:r>
-              <a:rPr lang="pt-BR" b="1" dirty="0" err="1" smtClean="0">
-                <a:solidFill>
-                  <a:srgbClr val="0070C0"/>
-                </a:solidFill>
-              </a:rPr>
-              <a:t>Factory</a:t>
-            </a:r>
-            <a:endParaRPr lang="pt-BR" b="1" dirty="0" smtClean="0">
-              <a:solidFill>
-                <a:srgbClr val="0070C0"/>
-              </a:solidFill>
-            </a:endParaRPr>
-          </a:p>
-          <a:p>
-            <a:pPr lvl="1"/>
+        </p:txBody>
+      </p:sp>
+      <p:sp>
+        <p:nvSpPr>
+          <p:cNvPr id="14" name="Retângulo de cantos arredondados 13"/>
+          <p:cNvSpPr/>
+          <p:nvPr/>
+        </p:nvSpPr>
+        <p:spPr>
+          <a:xfrm>
+            <a:off x="6985131" y="5589240"/>
+            <a:ext cx="978559" cy="432048"/>
+          </a:xfrm>
+          <a:prstGeom prst="roundRect">
+            <a:avLst/>
+          </a:prstGeom>
+        </p:spPr>
+        <p:style>
+          <a:lnRef idx="1">
+            <a:schemeClr val="dk1"/>
+          </a:lnRef>
+          <a:fillRef idx="2">
+            <a:schemeClr val="dk1"/>
+          </a:fillRef>
+          <a:effectRef idx="1">
+            <a:schemeClr val="dk1"/>
+          </a:effectRef>
+          <a:fontRef idx="minor">
+            <a:schemeClr val="dk1"/>
+          </a:fontRef>
+        </p:style>
+        <p:txBody>
+          <a:bodyPr rtlCol="0" anchor="ctr"/>
+          <a:lstStyle/>
+          <a:p>
+            <a:pPr algn="ctr"/>
             <a:r>
               <a:rPr lang="pt-BR" dirty="0" smtClean="0"/>
-              <a:t>Telas</a:t>
-            </a:r>
-          </a:p>
-          <a:p>
-            <a:pPr lvl="1"/>
+              <a:t>Excluir</a:t>
+            </a:r>
             <a:endParaRPr lang="pt-BR" dirty="0"/>
           </a:p>
-          <a:p>
-            <a:endParaRPr lang="pt-BR" dirty="0"/>
-          </a:p>
-          <a:p>
-            <a:endParaRPr lang="en-US" dirty="0"/>
-          </a:p>
         </p:txBody>
       </p:sp>
     </p:spTree>
+    <p:extLst>
+      <p:ext uri="{BB962C8B-B14F-4D97-AF65-F5344CB8AC3E}">
+        <p14:creationId xmlns:p14="http://schemas.microsoft.com/office/powerpoint/2010/main" val="4221770504"/>
+      </p:ext>
+    </p:extLst>
   </p:cSld>
   <p:clrMapOvr>
     <a:masterClrMapping/>
   </p:clrMapOvr>
-  <p:timing>
-    <p:tnLst>
-      <p:par>
-        <p:cTn id="1" dur="indefinite" restart="never" nodeType="tmRoot"/>
-      </p:par>
-    </p:tnLst>
-  </p:timing>
 </p:sld>
 </file>
 
@@ -6238,7 +7117,7 @@
       </p:grpSpPr>
       <p:sp>
         <p:nvSpPr>
-          <p:cNvPr id="2" name="Título 1"/>
+          <p:cNvPr id="5" name="Título 4"/>
           <p:cNvSpPr>
             <a:spLocks noGrp="1"/>
           </p:cNvSpPr>
@@ -6246,108 +7125,774 @@
             <p:ph type="title"/>
           </p:nvPr>
         </p:nvSpPr>
-        <p:spPr/>
-        <p:txBody>
-          <a:bodyPr>
-            <a:normAutofit/>
+        <p:spPr>
+          <a:xfrm>
+            <a:off x="457200" y="414936"/>
+            <a:ext cx="8229600" cy="1069848"/>
+          </a:xfrm>
+        </p:spPr>
+        <p:txBody>
+          <a:bodyPr/>
+          <a:lstStyle/>
+          <a:p>
+            <a:r>
+              <a:rPr lang="pt-BR" dirty="0" smtClean="0"/>
+              <a:t>Ver: Projeto</a:t>
+            </a:r>
+            <a:endParaRPr lang="pt-BR" dirty="0"/>
+          </a:p>
+        </p:txBody>
+      </p:sp>
+      <p:sp>
+        <p:nvSpPr>
+          <p:cNvPr id="6" name="Retângulo 5"/>
+          <p:cNvSpPr/>
+          <p:nvPr/>
+        </p:nvSpPr>
+        <p:spPr>
+          <a:xfrm>
+            <a:off x="611560" y="1412776"/>
+            <a:ext cx="8208912" cy="5112568"/>
+          </a:xfrm>
+          <a:prstGeom prst="rect">
+            <a:avLst/>
+          </a:prstGeom>
+        </p:spPr>
+        <p:style>
+          <a:lnRef idx="1">
+            <a:schemeClr val="dk1"/>
+          </a:lnRef>
+          <a:fillRef idx="2">
+            <a:schemeClr val="dk1"/>
+          </a:fillRef>
+          <a:effectRef idx="1">
+            <a:schemeClr val="dk1"/>
+          </a:effectRef>
+          <a:fontRef idx="minor">
+            <a:schemeClr val="dk1"/>
+          </a:fontRef>
+        </p:style>
+        <p:txBody>
+          <a:bodyPr rtlCol="0" anchor="ctr"/>
+          <a:lstStyle/>
+          <a:p>
+            <a:pPr algn="ctr"/>
+            <a:endParaRPr lang="pt-BR" dirty="0"/>
+          </a:p>
+        </p:txBody>
+      </p:sp>
+      <p:sp>
+        <p:nvSpPr>
+          <p:cNvPr id="7" name="Retângulo 6"/>
+          <p:cNvSpPr/>
+          <p:nvPr/>
+        </p:nvSpPr>
+        <p:spPr>
+          <a:xfrm>
+            <a:off x="971600" y="3861048"/>
+            <a:ext cx="7488832" cy="2376264"/>
+          </a:xfrm>
+          <a:prstGeom prst="rect">
+            <a:avLst/>
+          </a:prstGeom>
+        </p:spPr>
+        <p:style>
+          <a:lnRef idx="1">
+            <a:schemeClr val="dk1"/>
+          </a:lnRef>
+          <a:fillRef idx="2">
+            <a:schemeClr val="dk1"/>
+          </a:fillRef>
+          <a:effectRef idx="1">
+            <a:schemeClr val="dk1"/>
+          </a:effectRef>
+          <a:fontRef idx="minor">
+            <a:schemeClr val="dk1"/>
+          </a:fontRef>
+        </p:style>
+        <p:txBody>
+          <a:bodyPr rtlCol="0" anchor="ctr"/>
+          <a:lstStyle/>
+          <a:p>
+            <a:pPr algn="ctr"/>
+            <a:endParaRPr lang="pt-BR"/>
+          </a:p>
+        </p:txBody>
+      </p:sp>
+      <p:graphicFrame>
+        <p:nvGraphicFramePr>
+          <p:cNvPr id="8" name="Tabela 7"/>
+          <p:cNvGraphicFramePr>
+            <a:graphicFrameLocks noGrp="1"/>
+          </p:cNvGraphicFramePr>
+          <p:nvPr>
+            <p:extLst>
+              <p:ext uri="{D42A27DB-BD31-4B8C-83A1-F6EECF244321}">
+                <p14:modId xmlns:p14="http://schemas.microsoft.com/office/powerpoint/2010/main" val="1154050086"/>
+              </p:ext>
+            </p:extLst>
+          </p:nvPr>
+        </p:nvGraphicFramePr>
+        <p:xfrm>
+          <a:off x="980162" y="3885634"/>
+          <a:ext cx="7480270" cy="2351679"/>
+        </p:xfrm>
+        <a:graphic>
+          <a:graphicData uri="http://schemas.openxmlformats.org/drawingml/2006/table">
+            <a:tbl>
+              <a:tblPr firstRow="1" bandRow="1">
+                <a:tableStyleId>{5C22544A-7EE6-4342-B048-85BDC9FD1C3A}</a:tableStyleId>
+              </a:tblPr>
+              <a:tblGrid>
+                <a:gridCol w="689293"/>
+                <a:gridCol w="995680"/>
+                <a:gridCol w="1258793"/>
+                <a:gridCol w="864096"/>
+                <a:gridCol w="1296144"/>
+                <a:gridCol w="864096"/>
+                <a:gridCol w="1512168"/>
+              </a:tblGrid>
+              <a:tr h="783893">
+                <a:tc>
+                  <a:txBody>
+                    <a:bodyPr/>
+                    <a:lstStyle/>
+                    <a:p>
+                      <a:pPr algn="ctr"/>
+                      <a:r>
+                        <a:rPr lang="pt-BR" sz="1200" dirty="0" smtClean="0"/>
+                        <a:t>Nome</a:t>
+                      </a:r>
+                      <a:endParaRPr lang="pt-BR" sz="1200" dirty="0"/>
+                    </a:p>
+                  </a:txBody>
+                  <a:tcPr/>
+                </a:tc>
+                <a:tc>
+                  <a:txBody>
+                    <a:bodyPr/>
+                    <a:lstStyle/>
+                    <a:p>
+                      <a:pPr algn="ctr"/>
+                      <a:r>
+                        <a:rPr lang="pt-BR" sz="1200" dirty="0" smtClean="0"/>
+                        <a:t>Descrição</a:t>
+                      </a:r>
+                      <a:endParaRPr lang="pt-BR" sz="1200" dirty="0"/>
+                    </a:p>
+                  </a:txBody>
+                  <a:tcPr/>
+                </a:tc>
+                <a:tc>
+                  <a:txBody>
+                    <a:bodyPr/>
+                    <a:lstStyle/>
+                    <a:p>
+                      <a:pPr algn="ctr"/>
+                      <a:r>
+                        <a:rPr lang="pt-BR" sz="1200" dirty="0" smtClean="0"/>
+                        <a:t>DT Vencimento</a:t>
+                      </a:r>
+                      <a:endParaRPr lang="pt-BR" sz="1200" dirty="0"/>
+                    </a:p>
+                  </a:txBody>
+                  <a:tcPr/>
+                </a:tc>
+                <a:tc>
+                  <a:txBody>
+                    <a:bodyPr/>
+                    <a:lstStyle/>
+                    <a:p>
+                      <a:pPr algn="ctr"/>
+                      <a:r>
+                        <a:rPr lang="pt-BR" sz="1200" dirty="0" smtClean="0"/>
+                        <a:t>DT Criação </a:t>
+                      </a:r>
+                      <a:endParaRPr lang="pt-BR" sz="1200" dirty="0"/>
+                    </a:p>
+                  </a:txBody>
+                  <a:tcPr/>
+                </a:tc>
+                <a:tc>
+                  <a:txBody>
+                    <a:bodyPr/>
+                    <a:lstStyle/>
+                    <a:p>
+                      <a:pPr algn="ctr"/>
+                      <a:r>
+                        <a:rPr lang="pt-BR" sz="1200" dirty="0" smtClean="0"/>
+                        <a:t>DT Fechamento</a:t>
+                      </a:r>
+                      <a:endParaRPr lang="pt-BR" sz="1200" dirty="0"/>
+                    </a:p>
+                  </a:txBody>
+                  <a:tcPr/>
+                </a:tc>
+                <a:tc>
+                  <a:txBody>
+                    <a:bodyPr/>
+                    <a:lstStyle/>
+                    <a:p>
+                      <a:pPr algn="ctr"/>
+                      <a:r>
+                        <a:rPr lang="pt-BR" sz="1200" dirty="0" smtClean="0"/>
+                        <a:t>Situação</a:t>
+                      </a:r>
+                      <a:endParaRPr lang="pt-BR" sz="1200" dirty="0"/>
+                    </a:p>
+                  </a:txBody>
+                  <a:tcPr/>
+                </a:tc>
+                <a:tc>
+                  <a:txBody>
+                    <a:bodyPr/>
+                    <a:lstStyle/>
+                    <a:p>
+                      <a:pPr algn="ctr"/>
+                      <a:r>
+                        <a:rPr lang="pt-BR" sz="1200" dirty="0" smtClean="0"/>
+                        <a:t>Ações</a:t>
+                      </a:r>
+                      <a:endParaRPr lang="pt-BR" sz="1200" dirty="0"/>
+                    </a:p>
+                  </a:txBody>
+                  <a:tcPr/>
+                </a:tc>
+              </a:tr>
+              <a:tr h="783893">
+                <a:tc>
+                  <a:txBody>
+                    <a:bodyPr/>
+                    <a:lstStyle/>
+                    <a:p>
+                      <a:endParaRPr lang="pt-BR"/>
+                    </a:p>
+                  </a:txBody>
+                  <a:tcPr/>
+                </a:tc>
+                <a:tc>
+                  <a:txBody>
+                    <a:bodyPr/>
+                    <a:lstStyle/>
+                    <a:p>
+                      <a:endParaRPr lang="pt-BR"/>
+                    </a:p>
+                  </a:txBody>
+                  <a:tcPr/>
+                </a:tc>
+                <a:tc>
+                  <a:txBody>
+                    <a:bodyPr/>
+                    <a:lstStyle/>
+                    <a:p>
+                      <a:endParaRPr lang="pt-BR"/>
+                    </a:p>
+                  </a:txBody>
+                  <a:tcPr/>
+                </a:tc>
+                <a:tc>
+                  <a:txBody>
+                    <a:bodyPr/>
+                    <a:lstStyle/>
+                    <a:p>
+                      <a:endParaRPr lang="pt-BR"/>
+                    </a:p>
+                  </a:txBody>
+                  <a:tcPr/>
+                </a:tc>
+                <a:tc>
+                  <a:txBody>
+                    <a:bodyPr/>
+                    <a:lstStyle/>
+                    <a:p>
+                      <a:endParaRPr lang="pt-BR" dirty="0"/>
+                    </a:p>
+                  </a:txBody>
+                  <a:tcPr/>
+                </a:tc>
+                <a:tc>
+                  <a:txBody>
+                    <a:bodyPr/>
+                    <a:lstStyle/>
+                    <a:p>
+                      <a:endParaRPr lang="pt-BR"/>
+                    </a:p>
+                  </a:txBody>
+                  <a:tcPr/>
+                </a:tc>
+                <a:tc>
+                  <a:txBody>
+                    <a:bodyPr/>
+                    <a:lstStyle/>
+                    <a:p>
+                      <a:endParaRPr lang="pt-BR"/>
+                    </a:p>
+                  </a:txBody>
+                  <a:tcPr/>
+                </a:tc>
+              </a:tr>
+              <a:tr h="783893">
+                <a:tc>
+                  <a:txBody>
+                    <a:bodyPr/>
+                    <a:lstStyle/>
+                    <a:p>
+                      <a:endParaRPr lang="pt-BR"/>
+                    </a:p>
+                  </a:txBody>
+                  <a:tcPr/>
+                </a:tc>
+                <a:tc>
+                  <a:txBody>
+                    <a:bodyPr/>
+                    <a:lstStyle/>
+                    <a:p>
+                      <a:endParaRPr lang="pt-BR"/>
+                    </a:p>
+                  </a:txBody>
+                  <a:tcPr/>
+                </a:tc>
+                <a:tc>
+                  <a:txBody>
+                    <a:bodyPr/>
+                    <a:lstStyle/>
+                    <a:p>
+                      <a:endParaRPr lang="pt-BR" dirty="0"/>
+                    </a:p>
+                  </a:txBody>
+                  <a:tcPr/>
+                </a:tc>
+                <a:tc>
+                  <a:txBody>
+                    <a:bodyPr/>
+                    <a:lstStyle/>
+                    <a:p>
+                      <a:endParaRPr lang="pt-BR" dirty="0"/>
+                    </a:p>
+                  </a:txBody>
+                  <a:tcPr/>
+                </a:tc>
+                <a:tc>
+                  <a:txBody>
+                    <a:bodyPr/>
+                    <a:lstStyle/>
+                    <a:p>
+                      <a:endParaRPr lang="pt-BR" dirty="0"/>
+                    </a:p>
+                  </a:txBody>
+                  <a:tcPr/>
+                </a:tc>
+                <a:tc>
+                  <a:txBody>
+                    <a:bodyPr/>
+                    <a:lstStyle/>
+                    <a:p>
+                      <a:endParaRPr lang="pt-BR" dirty="0"/>
+                    </a:p>
+                  </a:txBody>
+                  <a:tcPr/>
+                </a:tc>
+                <a:tc>
+                  <a:txBody>
+                    <a:bodyPr/>
+                    <a:lstStyle/>
+                    <a:p>
+                      <a:endParaRPr lang="pt-BR" dirty="0"/>
+                    </a:p>
+                  </a:txBody>
+                  <a:tcPr/>
+                </a:tc>
+              </a:tr>
+            </a:tbl>
+          </a:graphicData>
+        </a:graphic>
+      </p:graphicFrame>
+      <p:sp>
+        <p:nvSpPr>
+          <p:cNvPr id="2" name="CaixaDeTexto 1"/>
+          <p:cNvSpPr txBox="1"/>
+          <p:nvPr/>
+        </p:nvSpPr>
+        <p:spPr>
+          <a:xfrm>
+            <a:off x="3459477" y="1556792"/>
+            <a:ext cx="2768707" cy="523220"/>
+          </a:xfrm>
+          <a:prstGeom prst="rect">
+            <a:avLst/>
+          </a:prstGeom>
+          <a:noFill/>
+        </p:spPr>
+        <p:txBody>
+          <a:bodyPr wrap="none" rtlCol="0">
+            <a:spAutoFit/>
           </a:bodyPr>
           <a:lstStyle/>
           <a:p>
             <a:r>
+              <a:rPr lang="pt-BR" sz="2800" b="1" u="sng" dirty="0" err="1" smtClean="0"/>
+              <a:t>Projeto.Nome</a:t>
+            </a:r>
+            <a:endParaRPr lang="pt-BR" sz="2800" b="1" u="sng" dirty="0"/>
+          </a:p>
+        </p:txBody>
+      </p:sp>
+      <p:sp>
+        <p:nvSpPr>
+          <p:cNvPr id="4" name="Retângulo 3"/>
+          <p:cNvSpPr/>
+          <p:nvPr/>
+        </p:nvSpPr>
+        <p:spPr>
+          <a:xfrm>
+            <a:off x="971600" y="2276872"/>
+            <a:ext cx="7488832" cy="792088"/>
+          </a:xfrm>
+          <a:prstGeom prst="rect">
+            <a:avLst/>
+          </a:prstGeom>
+        </p:spPr>
+        <p:style>
+          <a:lnRef idx="1">
+            <a:schemeClr val="dk1"/>
+          </a:lnRef>
+          <a:fillRef idx="2">
+            <a:schemeClr val="dk1"/>
+          </a:fillRef>
+          <a:effectRef idx="1">
+            <a:schemeClr val="dk1"/>
+          </a:effectRef>
+          <a:fontRef idx="minor">
+            <a:schemeClr val="dk1"/>
+          </a:fontRef>
+        </p:style>
+        <p:txBody>
+          <a:bodyPr rtlCol="0" anchor="ctr"/>
+          <a:lstStyle/>
+          <a:p>
+            <a:pPr algn="ctr"/>
+            <a:r>
+              <a:rPr lang="pt-BR" dirty="0" err="1"/>
+              <a:t>Projeto.descrição</a:t>
+            </a:r>
+            <a:endParaRPr lang="pt-BR" dirty="0"/>
+          </a:p>
+        </p:txBody>
+      </p:sp>
+      <p:sp>
+        <p:nvSpPr>
+          <p:cNvPr id="15" name="Retângulo de cantos arredondados 14"/>
+          <p:cNvSpPr/>
+          <p:nvPr/>
+        </p:nvSpPr>
+        <p:spPr>
+          <a:xfrm>
+            <a:off x="1044739" y="3212976"/>
+            <a:ext cx="1799069" cy="432048"/>
+          </a:xfrm>
+          <a:prstGeom prst="roundRect">
+            <a:avLst/>
+          </a:prstGeom>
+        </p:spPr>
+        <p:style>
+          <a:lnRef idx="1">
+            <a:schemeClr val="dk1"/>
+          </a:lnRef>
+          <a:fillRef idx="2">
+            <a:schemeClr val="dk1"/>
+          </a:fillRef>
+          <a:effectRef idx="1">
+            <a:schemeClr val="dk1"/>
+          </a:effectRef>
+          <a:fontRef idx="minor">
+            <a:schemeClr val="dk1"/>
+          </a:fontRef>
+        </p:style>
+        <p:txBody>
+          <a:bodyPr rtlCol="0" anchor="ctr"/>
+          <a:lstStyle/>
+          <a:p>
+            <a:pPr algn="ctr"/>
+            <a:r>
               <a:rPr lang="pt-BR" dirty="0" smtClean="0"/>
-              <a:t>Padrões de Projeto</a:t>
-            </a:r>
-            <a:endParaRPr lang="en-US" dirty="0"/>
-          </a:p>
-        </p:txBody>
-      </p:sp>
-      <p:sp>
-        <p:nvSpPr>
-          <p:cNvPr id="5" name="Espaço Reservado para Conteúdo 4"/>
-          <p:cNvSpPr>
-            <a:spLocks noGrp="1"/>
-          </p:cNvSpPr>
-          <p:nvPr>
-            <p:ph idx="1"/>
-          </p:nvPr>
-        </p:nvSpPr>
-        <p:spPr/>
-        <p:txBody>
-          <a:bodyPr>
-            <a:normAutofit/>
+              <a:t>Criar Tarefa</a:t>
+            </a:r>
+            <a:endParaRPr lang="pt-BR" dirty="0"/>
+          </a:p>
+        </p:txBody>
+      </p:sp>
+      <p:sp>
+        <p:nvSpPr>
+          <p:cNvPr id="16" name="Retângulo 15"/>
+          <p:cNvSpPr/>
+          <p:nvPr/>
+        </p:nvSpPr>
+        <p:spPr>
+          <a:xfrm>
+            <a:off x="4139952" y="3212976"/>
+            <a:ext cx="4320480" cy="432048"/>
+          </a:xfrm>
+          <a:prstGeom prst="rect">
+            <a:avLst/>
+          </a:prstGeom>
+        </p:spPr>
+        <p:style>
+          <a:lnRef idx="2">
+            <a:schemeClr val="dk1"/>
+          </a:lnRef>
+          <a:fillRef idx="1">
+            <a:schemeClr val="lt1"/>
+          </a:fillRef>
+          <a:effectRef idx="0">
+            <a:schemeClr val="dk1"/>
+          </a:effectRef>
+          <a:fontRef idx="minor">
+            <a:schemeClr val="dk1"/>
+          </a:fontRef>
+        </p:style>
+        <p:txBody>
+          <a:bodyPr rtlCol="0" anchor="ctr"/>
+          <a:lstStyle/>
+          <a:p>
+            <a:pPr algn="ctr"/>
+            <a:endParaRPr lang="pt-BR"/>
+          </a:p>
+        </p:txBody>
+      </p:sp>
+      <p:sp>
+        <p:nvSpPr>
+          <p:cNvPr id="17" name="CaixaDeTexto 16"/>
+          <p:cNvSpPr txBox="1"/>
+          <p:nvPr/>
+        </p:nvSpPr>
+        <p:spPr>
+          <a:xfrm>
+            <a:off x="3203848" y="3232287"/>
+            <a:ext cx="827471" cy="369332"/>
+          </a:xfrm>
+          <a:prstGeom prst="rect">
+            <a:avLst/>
+          </a:prstGeom>
+          <a:noFill/>
+        </p:spPr>
+        <p:txBody>
+          <a:bodyPr wrap="none" rtlCol="0">
+            <a:spAutoFit/>
           </a:bodyPr>
           <a:lstStyle/>
           <a:p>
             <a:r>
-              <a:rPr lang="pt-BR" b="1" dirty="0" err="1" smtClean="0">
-                <a:solidFill>
-                  <a:srgbClr val="0070C0"/>
-                </a:solidFill>
-              </a:rPr>
-              <a:t>Strategy</a:t>
-            </a:r>
-            <a:endParaRPr lang="pt-BR" b="1" dirty="0">
-              <a:solidFill>
-                <a:srgbClr val="0070C0"/>
-              </a:solidFill>
-            </a:endParaRPr>
-          </a:p>
-          <a:p>
-            <a:pPr lvl="1"/>
-            <a:r>
               <a:rPr lang="pt-BR" dirty="0" smtClean="0"/>
-              <a:t>Ordenação das tarefas:</a:t>
+              <a:t>Filtro:</a:t>
             </a:r>
             <a:endParaRPr lang="pt-BR" dirty="0"/>
           </a:p>
-          <a:p>
-            <a:pPr lvl="2"/>
+        </p:txBody>
+      </p:sp>
+      <p:sp>
+        <p:nvSpPr>
+          <p:cNvPr id="18" name="Retângulo 17"/>
+          <p:cNvSpPr/>
+          <p:nvPr/>
+        </p:nvSpPr>
+        <p:spPr>
+          <a:xfrm>
+            <a:off x="7963690" y="3232287"/>
+            <a:ext cx="496742" cy="412737"/>
+          </a:xfrm>
+          <a:prstGeom prst="rect">
+            <a:avLst/>
+          </a:prstGeom>
+        </p:spPr>
+        <p:style>
+          <a:lnRef idx="2">
+            <a:schemeClr val="dk1"/>
+          </a:lnRef>
+          <a:fillRef idx="1">
+            <a:schemeClr val="lt1"/>
+          </a:fillRef>
+          <a:effectRef idx="0">
+            <a:schemeClr val="dk1"/>
+          </a:effectRef>
+          <a:fontRef idx="minor">
+            <a:schemeClr val="dk1"/>
+          </a:fontRef>
+        </p:style>
+        <p:txBody>
+          <a:bodyPr rtlCol="0" anchor="ctr"/>
+          <a:lstStyle/>
+          <a:p>
+            <a:pPr algn="ctr"/>
+            <a:endParaRPr lang="pt-BR"/>
+          </a:p>
+        </p:txBody>
+      </p:sp>
+      <p:sp>
+        <p:nvSpPr>
+          <p:cNvPr id="19" name="Fluxograma: Mesclar 18"/>
+          <p:cNvSpPr/>
+          <p:nvPr/>
+        </p:nvSpPr>
+        <p:spPr>
+          <a:xfrm>
+            <a:off x="8068045" y="3335471"/>
+            <a:ext cx="288032" cy="206368"/>
+          </a:xfrm>
+          <a:prstGeom prst="flowChartMerge">
+            <a:avLst/>
+          </a:prstGeom>
+        </p:spPr>
+        <p:style>
+          <a:lnRef idx="2">
+            <a:schemeClr val="dk1"/>
+          </a:lnRef>
+          <a:fillRef idx="1">
+            <a:schemeClr val="lt1"/>
+          </a:fillRef>
+          <a:effectRef idx="0">
+            <a:schemeClr val="dk1"/>
+          </a:effectRef>
+          <a:fontRef idx="minor">
+            <a:schemeClr val="dk1"/>
+          </a:fontRef>
+        </p:style>
+        <p:txBody>
+          <a:bodyPr rtlCol="0" anchor="ctr"/>
+          <a:lstStyle/>
+          <a:p>
+            <a:pPr algn="ctr"/>
+            <a:endParaRPr lang="pt-BR"/>
+          </a:p>
+        </p:txBody>
+      </p:sp>
+      <p:sp>
+        <p:nvSpPr>
+          <p:cNvPr id="20" name="CaixaDeTexto 19"/>
+          <p:cNvSpPr txBox="1"/>
+          <p:nvPr/>
+        </p:nvSpPr>
+        <p:spPr>
+          <a:xfrm>
+            <a:off x="6548893" y="620688"/>
+            <a:ext cx="2248450" cy="646331"/>
+          </a:xfrm>
+          <a:prstGeom prst="rect">
+            <a:avLst/>
+          </a:prstGeom>
+          <a:noFill/>
+        </p:spPr>
+        <p:txBody>
+          <a:bodyPr wrap="square" rtlCol="0">
+            <a:spAutoFit/>
+          </a:bodyPr>
+          <a:lstStyle/>
+          <a:p>
+            <a:r>
+              <a:rPr lang="pt-BR" b="1" dirty="0" smtClean="0"/>
+              <a:t>Filtros</a:t>
+            </a:r>
             <a:r>
               <a:rPr lang="pt-BR" dirty="0" smtClean="0"/>
-              <a:t>Implementar um algoritmo de ordenação</a:t>
-            </a:r>
-          </a:p>
-          <a:p>
-            <a:pPr lvl="2"/>
-            <a:r>
-              <a:rPr lang="pt-BR" dirty="0" smtClean="0"/>
-              <a:t>Usar o </a:t>
-            </a:r>
-            <a:r>
-              <a:rPr lang="pt-BR" dirty="0" err="1" smtClean="0"/>
-              <a:t>Quicksort</a:t>
+              <a:t>: situação da tarefa ou todas.</a:t>
             </a:r>
             <a:endParaRPr lang="pt-BR" dirty="0"/>
           </a:p>
-          <a:p>
-            <a:pPr lvl="1"/>
+        </p:txBody>
+      </p:sp>
+      <p:sp>
+        <p:nvSpPr>
+          <p:cNvPr id="21" name="Retângulo de cantos arredondados 20"/>
+          <p:cNvSpPr/>
+          <p:nvPr/>
+        </p:nvSpPr>
+        <p:spPr>
+          <a:xfrm>
+            <a:off x="7300186" y="4726713"/>
+            <a:ext cx="722669" cy="344616"/>
+          </a:xfrm>
+          <a:prstGeom prst="roundRect">
+            <a:avLst/>
+          </a:prstGeom>
+        </p:spPr>
+        <p:style>
+          <a:lnRef idx="1">
+            <a:schemeClr val="dk1"/>
+          </a:lnRef>
+          <a:fillRef idx="2">
+            <a:schemeClr val="dk1"/>
+          </a:fillRef>
+          <a:effectRef idx="1">
+            <a:schemeClr val="dk1"/>
+          </a:effectRef>
+          <a:fontRef idx="minor">
+            <a:schemeClr val="dk1"/>
+          </a:fontRef>
+        </p:style>
+        <p:txBody>
+          <a:bodyPr rtlCol="0" anchor="ctr"/>
+          <a:lstStyle/>
+          <a:p>
+            <a:pPr algn="ctr"/>
+            <a:r>
+              <a:rPr lang="pt-BR" sz="1200" dirty="0" smtClean="0"/>
+              <a:t>Editar</a:t>
+            </a:r>
             <a:endParaRPr lang="pt-BR" dirty="0"/>
           </a:p>
-          <a:p>
+        </p:txBody>
+      </p:sp>
+      <p:sp>
+        <p:nvSpPr>
+          <p:cNvPr id="22" name="Retângulo de cantos arredondados 21"/>
+          <p:cNvSpPr/>
+          <p:nvPr/>
+        </p:nvSpPr>
+        <p:spPr>
+          <a:xfrm>
+            <a:off x="7306773" y="5085184"/>
+            <a:ext cx="721611" cy="318602"/>
+          </a:xfrm>
+          <a:prstGeom prst="roundRect">
+            <a:avLst/>
+          </a:prstGeom>
+        </p:spPr>
+        <p:style>
+          <a:lnRef idx="1">
+            <a:schemeClr val="dk1"/>
+          </a:lnRef>
+          <a:fillRef idx="2">
+            <a:schemeClr val="dk1"/>
+          </a:fillRef>
+          <a:effectRef idx="1">
+            <a:schemeClr val="dk1"/>
+          </a:effectRef>
+          <a:fontRef idx="minor">
+            <a:schemeClr val="dk1"/>
+          </a:fontRef>
+        </p:style>
+        <p:txBody>
+          <a:bodyPr rtlCol="0" anchor="ctr"/>
+          <a:lstStyle/>
+          <a:p>
+            <a:pPr algn="ctr"/>
+            <a:r>
+              <a:rPr lang="pt-BR" sz="1200" dirty="0" smtClean="0"/>
+              <a:t>Excluir</a:t>
+            </a:r>
             <a:endParaRPr lang="pt-BR" dirty="0"/>
-          </a:p>
-          <a:p>
-            <a:endParaRPr lang="en-US" dirty="0"/>
           </a:p>
         </p:txBody>
       </p:sp>
     </p:spTree>
     <p:extLst>
       <p:ext uri="{BB962C8B-B14F-4D97-AF65-F5344CB8AC3E}">
-        <p14:creationId xmlns:p14="http://schemas.microsoft.com/office/powerpoint/2010/main" val="2545713470"/>
+        <p14:creationId xmlns:p14="http://schemas.microsoft.com/office/powerpoint/2010/main" val="3054459368"/>
       </p:ext>
     </p:extLst>
   </p:cSld>
   <p:clrMapOvr>
     <a:masterClrMapping/>
   </p:clrMapOvr>
-  <p:timing>
-    <p:tnLst>
-      <p:par>
-        <p:cTn id="1" dur="indefinite" restart="never" nodeType="tmRoot"/>
-      </p:par>
-    </p:tnLst>
-  </p:timing>
 </p:sld>
 </file>
 
@@ -6370,7 +7915,7 @@
       </p:grpSpPr>
       <p:sp>
         <p:nvSpPr>
-          <p:cNvPr id="2" name="Título 1"/>
+          <p:cNvPr id="5" name="Título 4"/>
           <p:cNvSpPr>
             <a:spLocks noGrp="1"/>
           </p:cNvSpPr>
@@ -6378,126 +7923,622 @@
             <p:ph type="title"/>
           </p:nvPr>
         </p:nvSpPr>
-        <p:spPr/>
+        <p:spPr>
+          <a:xfrm>
+            <a:off x="457200" y="414936"/>
+            <a:ext cx="8229600" cy="1069848"/>
+          </a:xfrm>
+        </p:spPr>
         <p:txBody>
           <a:bodyPr/>
           <a:lstStyle/>
           <a:p>
             <a:r>
               <a:rPr lang="pt-BR" dirty="0" smtClean="0"/>
-              <a:t>Principais Interfaces</a:t>
-            </a:r>
-            <a:endParaRPr lang="en-US" dirty="0"/>
-          </a:p>
-        </p:txBody>
-      </p:sp>
-      <p:sp>
-        <p:nvSpPr>
-          <p:cNvPr id="3" name="Espaço Reservado para Conteúdo 2"/>
-          <p:cNvSpPr>
-            <a:spLocks noGrp="1"/>
-          </p:cNvSpPr>
-          <p:nvPr>
-            <p:ph idx="1"/>
-          </p:nvPr>
-        </p:nvSpPr>
-        <p:spPr/>
-        <p:txBody>
-          <a:bodyPr>
-            <a:normAutofit/>
+              <a:t>Criar/Editar: Tarefa</a:t>
+            </a:r>
+            <a:endParaRPr lang="pt-BR" dirty="0"/>
+          </a:p>
+        </p:txBody>
+      </p:sp>
+      <p:sp>
+        <p:nvSpPr>
+          <p:cNvPr id="6" name="Retângulo 5"/>
+          <p:cNvSpPr/>
+          <p:nvPr/>
+        </p:nvSpPr>
+        <p:spPr>
+          <a:xfrm>
+            <a:off x="611560" y="1412776"/>
+            <a:ext cx="8208912" cy="4104456"/>
+          </a:xfrm>
+          <a:prstGeom prst="rect">
+            <a:avLst/>
+          </a:prstGeom>
+        </p:spPr>
+        <p:style>
+          <a:lnRef idx="1">
+            <a:schemeClr val="dk1"/>
+          </a:lnRef>
+          <a:fillRef idx="2">
+            <a:schemeClr val="dk1"/>
+          </a:fillRef>
+          <a:effectRef idx="1">
+            <a:schemeClr val="dk1"/>
+          </a:effectRef>
+          <a:fontRef idx="minor">
+            <a:schemeClr val="dk1"/>
+          </a:fontRef>
+        </p:style>
+        <p:txBody>
+          <a:bodyPr rtlCol="0" anchor="ctr"/>
+          <a:lstStyle/>
+          <a:p>
+            <a:pPr algn="ctr"/>
+            <a:endParaRPr lang="pt-BR" dirty="0"/>
+          </a:p>
+        </p:txBody>
+      </p:sp>
+      <p:sp>
+        <p:nvSpPr>
+          <p:cNvPr id="2" name="CaixaDeTexto 1"/>
+          <p:cNvSpPr txBox="1"/>
+          <p:nvPr/>
+        </p:nvSpPr>
+        <p:spPr>
+          <a:xfrm>
+            <a:off x="3459477" y="1556792"/>
+            <a:ext cx="2606804" cy="523220"/>
+          </a:xfrm>
+          <a:prstGeom prst="rect">
+            <a:avLst/>
+          </a:prstGeom>
+          <a:noFill/>
+        </p:spPr>
+        <p:txBody>
+          <a:bodyPr wrap="none" rtlCol="0">
+            <a:spAutoFit/>
           </a:bodyPr>
           <a:lstStyle/>
           <a:p>
             <a:r>
-              <a:rPr lang="pt-BR" b="1" dirty="0" err="1" smtClean="0">
-                <a:solidFill>
-                  <a:srgbClr val="0070C0"/>
-                </a:solidFill>
-              </a:rPr>
-              <a:t>Comparable</a:t>
-            </a:r>
-            <a:endParaRPr lang="pt-BR" b="1" u="sng" dirty="0" smtClean="0">
-              <a:solidFill>
-                <a:srgbClr val="0070C0"/>
-              </a:solidFill>
-            </a:endParaRPr>
-          </a:p>
-          <a:p>
-            <a:pPr lvl="1"/>
+              <a:rPr lang="pt-BR" sz="2800" b="1" u="sng" dirty="0" err="1" smtClean="0"/>
+              <a:t>Tarefa.Nome</a:t>
+            </a:r>
+            <a:endParaRPr lang="pt-BR" sz="2800" b="1" u="sng" dirty="0"/>
+          </a:p>
+        </p:txBody>
+      </p:sp>
+      <p:sp>
+        <p:nvSpPr>
+          <p:cNvPr id="4" name="Retângulo 3"/>
+          <p:cNvSpPr/>
+          <p:nvPr/>
+        </p:nvSpPr>
+        <p:spPr>
+          <a:xfrm>
+            <a:off x="971600" y="2276872"/>
+            <a:ext cx="7488832" cy="792088"/>
+          </a:xfrm>
+          <a:prstGeom prst="rect">
+            <a:avLst/>
+          </a:prstGeom>
+        </p:spPr>
+        <p:style>
+          <a:lnRef idx="2">
+            <a:schemeClr val="dk1"/>
+          </a:lnRef>
+          <a:fillRef idx="1">
+            <a:schemeClr val="lt1"/>
+          </a:fillRef>
+          <a:effectRef idx="0">
+            <a:schemeClr val="dk1"/>
+          </a:effectRef>
+          <a:fontRef idx="minor">
+            <a:schemeClr val="dk1"/>
+          </a:fontRef>
+        </p:style>
+        <p:txBody>
+          <a:bodyPr rtlCol="0" anchor="ctr"/>
+          <a:lstStyle/>
+          <a:p>
+            <a:pPr algn="ctr"/>
+            <a:r>
+              <a:rPr lang="pt-BR" dirty="0" err="1" smtClean="0"/>
+              <a:t>Tarefa.descrição</a:t>
+            </a:r>
+            <a:endParaRPr lang="pt-BR" dirty="0"/>
+          </a:p>
+        </p:txBody>
+      </p:sp>
+      <p:sp>
+        <p:nvSpPr>
+          <p:cNvPr id="15" name="Retângulo de cantos arredondados 14"/>
+          <p:cNvSpPr/>
+          <p:nvPr/>
+        </p:nvSpPr>
+        <p:spPr>
+          <a:xfrm>
+            <a:off x="7300186" y="4797152"/>
+            <a:ext cx="1194495" cy="432048"/>
+          </a:xfrm>
+          <a:prstGeom prst="roundRect">
+            <a:avLst/>
+          </a:prstGeom>
+        </p:spPr>
+        <p:style>
+          <a:lnRef idx="1">
+            <a:schemeClr val="dk1"/>
+          </a:lnRef>
+          <a:fillRef idx="2">
+            <a:schemeClr val="dk1"/>
+          </a:fillRef>
+          <a:effectRef idx="1">
+            <a:schemeClr val="dk1"/>
+          </a:effectRef>
+          <a:fontRef idx="minor">
+            <a:schemeClr val="dk1"/>
+          </a:fontRef>
+        </p:style>
+        <p:txBody>
+          <a:bodyPr rtlCol="0" anchor="ctr"/>
+          <a:lstStyle/>
+          <a:p>
+            <a:pPr algn="ctr"/>
             <a:r>
               <a:rPr lang="pt-BR" dirty="0" smtClean="0"/>
-              <a:t>Projeto</a:t>
-            </a:r>
-          </a:p>
-          <a:p>
-            <a:pPr lvl="1"/>
+              <a:t>Salvar</a:t>
+            </a:r>
+            <a:endParaRPr lang="pt-BR" dirty="0"/>
+          </a:p>
+        </p:txBody>
+      </p:sp>
+      <p:sp>
+        <p:nvSpPr>
+          <p:cNvPr id="16" name="Retângulo 15"/>
+          <p:cNvSpPr/>
+          <p:nvPr/>
+        </p:nvSpPr>
+        <p:spPr>
+          <a:xfrm>
+            <a:off x="6350510" y="3212976"/>
+            <a:ext cx="2109922" cy="432048"/>
+          </a:xfrm>
+          <a:prstGeom prst="rect">
+            <a:avLst/>
+          </a:prstGeom>
+        </p:spPr>
+        <p:style>
+          <a:lnRef idx="2">
+            <a:schemeClr val="dk1"/>
+          </a:lnRef>
+          <a:fillRef idx="1">
+            <a:schemeClr val="lt1"/>
+          </a:fillRef>
+          <a:effectRef idx="0">
+            <a:schemeClr val="dk1"/>
+          </a:effectRef>
+          <a:fontRef idx="minor">
+            <a:schemeClr val="dk1"/>
+          </a:fontRef>
+        </p:style>
+        <p:txBody>
+          <a:bodyPr rtlCol="0" anchor="ctr"/>
+          <a:lstStyle/>
+          <a:p>
+            <a:pPr algn="ctr"/>
+            <a:endParaRPr lang="pt-BR"/>
+          </a:p>
+        </p:txBody>
+      </p:sp>
+      <p:sp>
+        <p:nvSpPr>
+          <p:cNvPr id="17" name="CaixaDeTexto 16"/>
+          <p:cNvSpPr txBox="1"/>
+          <p:nvPr/>
+        </p:nvSpPr>
+        <p:spPr>
+          <a:xfrm>
+            <a:off x="5169754" y="3253989"/>
+            <a:ext cx="1130438" cy="369332"/>
+          </a:xfrm>
+          <a:prstGeom prst="rect">
+            <a:avLst/>
+          </a:prstGeom>
+          <a:noFill/>
+        </p:spPr>
+        <p:txBody>
+          <a:bodyPr wrap="none" rtlCol="0">
+            <a:spAutoFit/>
+          </a:bodyPr>
+          <a:lstStyle/>
+          <a:p>
             <a:r>
               <a:rPr lang="pt-BR" dirty="0" smtClean="0"/>
-              <a:t>Tarefa</a:t>
-            </a:r>
-          </a:p>
-          <a:p>
-            <a:pPr lvl="1"/>
+              <a:t>Situação:</a:t>
+            </a:r>
+            <a:endParaRPr lang="pt-BR" dirty="0"/>
+          </a:p>
+        </p:txBody>
+      </p:sp>
+      <p:sp>
+        <p:nvSpPr>
+          <p:cNvPr id="18" name="Retângulo 17"/>
+          <p:cNvSpPr/>
+          <p:nvPr/>
+        </p:nvSpPr>
+        <p:spPr>
+          <a:xfrm>
+            <a:off x="7963690" y="3232287"/>
+            <a:ext cx="496742" cy="412737"/>
+          </a:xfrm>
+          <a:prstGeom prst="rect">
+            <a:avLst/>
+          </a:prstGeom>
+        </p:spPr>
+        <p:style>
+          <a:lnRef idx="2">
+            <a:schemeClr val="dk1"/>
+          </a:lnRef>
+          <a:fillRef idx="1">
+            <a:schemeClr val="lt1"/>
+          </a:fillRef>
+          <a:effectRef idx="0">
+            <a:schemeClr val="dk1"/>
+          </a:effectRef>
+          <a:fontRef idx="minor">
+            <a:schemeClr val="dk1"/>
+          </a:fontRef>
+        </p:style>
+        <p:txBody>
+          <a:bodyPr rtlCol="0" anchor="ctr"/>
+          <a:lstStyle/>
+          <a:p>
+            <a:pPr algn="ctr"/>
+            <a:endParaRPr lang="pt-BR"/>
+          </a:p>
+        </p:txBody>
+      </p:sp>
+      <p:sp>
+        <p:nvSpPr>
+          <p:cNvPr id="19" name="Fluxograma: Mesclar 18"/>
+          <p:cNvSpPr/>
+          <p:nvPr/>
+        </p:nvSpPr>
+        <p:spPr>
+          <a:xfrm>
+            <a:off x="8068045" y="3335471"/>
+            <a:ext cx="288032" cy="206368"/>
+          </a:xfrm>
+          <a:prstGeom prst="flowChartMerge">
+            <a:avLst/>
+          </a:prstGeom>
+        </p:spPr>
+        <p:style>
+          <a:lnRef idx="2">
+            <a:schemeClr val="dk1"/>
+          </a:lnRef>
+          <a:fillRef idx="1">
+            <a:schemeClr val="lt1"/>
+          </a:fillRef>
+          <a:effectRef idx="0">
+            <a:schemeClr val="dk1"/>
+          </a:effectRef>
+          <a:fontRef idx="minor">
+            <a:schemeClr val="dk1"/>
+          </a:fontRef>
+        </p:style>
+        <p:txBody>
+          <a:bodyPr rtlCol="0" anchor="ctr"/>
+          <a:lstStyle/>
+          <a:p>
+            <a:pPr algn="ctr"/>
+            <a:endParaRPr lang="pt-BR"/>
+          </a:p>
+        </p:txBody>
+      </p:sp>
+      <p:sp>
+        <p:nvSpPr>
+          <p:cNvPr id="20" name="CaixaDeTexto 19"/>
+          <p:cNvSpPr txBox="1"/>
+          <p:nvPr/>
+        </p:nvSpPr>
+        <p:spPr>
+          <a:xfrm>
+            <a:off x="6300192" y="620688"/>
+            <a:ext cx="2497151" cy="646331"/>
+          </a:xfrm>
+          <a:prstGeom prst="rect">
+            <a:avLst/>
+          </a:prstGeom>
+          <a:noFill/>
+        </p:spPr>
+        <p:txBody>
+          <a:bodyPr wrap="square" rtlCol="0">
+            <a:spAutoFit/>
+          </a:bodyPr>
+          <a:lstStyle/>
+          <a:p>
+            <a:r>
+              <a:rPr lang="pt-BR" b="1" dirty="0" smtClean="0"/>
+              <a:t>Situações</a:t>
+            </a:r>
             <a:r>
               <a:rPr lang="pt-BR" dirty="0" smtClean="0"/>
-              <a:t>Situação</a:t>
-            </a:r>
-          </a:p>
-          <a:p>
-            <a:pPr lvl="1"/>
+              <a:t>: a fazer, fazendo, pronto</a:t>
+            </a:r>
+            <a:r>
+              <a:rPr lang="pt-BR" b="1" dirty="0" smtClean="0"/>
+              <a:t>.</a:t>
+            </a:r>
             <a:endParaRPr lang="pt-BR" dirty="0"/>
           </a:p>
-          <a:p>
-            <a:r>
-              <a:rPr lang="pt-BR" b="1" dirty="0" err="1" smtClean="0">
-                <a:solidFill>
-                  <a:srgbClr val="0070C0"/>
-                </a:solidFill>
-              </a:rPr>
-              <a:t>Serializable</a:t>
-            </a:r>
-            <a:endParaRPr lang="pt-BR" b="1" dirty="0" smtClean="0">
-              <a:solidFill>
-                <a:srgbClr val="0070C0"/>
-              </a:solidFill>
-            </a:endParaRPr>
-          </a:p>
-          <a:p>
-            <a:pPr lvl="1"/>
+        </p:txBody>
+      </p:sp>
+      <p:graphicFrame>
+        <p:nvGraphicFramePr>
+          <p:cNvPr id="3" name="Tabela 2"/>
+          <p:cNvGraphicFramePr>
+            <a:graphicFrameLocks noGrp="1"/>
+          </p:cNvGraphicFramePr>
+          <p:nvPr>
+            <p:extLst>
+              <p:ext uri="{D42A27DB-BD31-4B8C-83A1-F6EECF244321}">
+                <p14:modId xmlns:p14="http://schemas.microsoft.com/office/powerpoint/2010/main" val="3876574966"/>
+              </p:ext>
+            </p:extLst>
+          </p:nvPr>
+        </p:nvGraphicFramePr>
+        <p:xfrm>
+          <a:off x="971598" y="3861048"/>
+          <a:ext cx="7488834" cy="741680"/>
+        </p:xfrm>
+        <a:graphic>
+          <a:graphicData uri="http://schemas.openxmlformats.org/drawingml/2006/table">
+            <a:tbl>
+              <a:tblPr firstRow="1" bandRow="1">
+                <a:tableStyleId>{5C22544A-7EE6-4342-B048-85BDC9FD1C3A}</a:tableStyleId>
+              </a:tblPr>
+              <a:tblGrid>
+                <a:gridCol w="3744417"/>
+                <a:gridCol w="3744417"/>
+              </a:tblGrid>
+              <a:tr h="370840">
+                <a:tc>
+                  <a:txBody>
+                    <a:bodyPr/>
+                    <a:lstStyle/>
+                    <a:p>
+                      <a:r>
+                        <a:rPr lang="pt-BR" dirty="0" smtClean="0"/>
+                        <a:t>Data de criação</a:t>
+                      </a:r>
+                      <a:endParaRPr lang="pt-BR" dirty="0"/>
+                    </a:p>
+                  </a:txBody>
+                  <a:tcPr/>
+                </a:tc>
+                <a:tc>
+                  <a:txBody>
+                    <a:bodyPr/>
+                    <a:lstStyle/>
+                    <a:p>
+                      <a:r>
+                        <a:rPr lang="pt-BR" dirty="0" smtClean="0"/>
+                        <a:t>Data de Fechamento</a:t>
+                      </a:r>
+                      <a:endParaRPr lang="pt-BR" dirty="0"/>
+                    </a:p>
+                  </a:txBody>
+                  <a:tcPr/>
+                </a:tc>
+              </a:tr>
+              <a:tr h="370840">
+                <a:tc>
+                  <a:txBody>
+                    <a:bodyPr/>
+                    <a:lstStyle/>
+                    <a:p>
+                      <a:endParaRPr lang="pt-BR" dirty="0"/>
+                    </a:p>
+                  </a:txBody>
+                  <a:tcPr/>
+                </a:tc>
+                <a:tc>
+                  <a:txBody>
+                    <a:bodyPr/>
+                    <a:lstStyle/>
+                    <a:p>
+                      <a:endParaRPr lang="pt-BR" dirty="0"/>
+                    </a:p>
+                  </a:txBody>
+                  <a:tcPr/>
+                </a:tc>
+              </a:tr>
+            </a:tbl>
+          </a:graphicData>
+        </a:graphic>
+      </p:graphicFrame>
+      <p:sp>
+        <p:nvSpPr>
+          <p:cNvPr id="23" name="Retângulo 22"/>
+          <p:cNvSpPr/>
+          <p:nvPr/>
+        </p:nvSpPr>
+        <p:spPr>
+          <a:xfrm>
+            <a:off x="2675531" y="3249262"/>
+            <a:ext cx="2016224" cy="432048"/>
+          </a:xfrm>
+          <a:prstGeom prst="rect">
+            <a:avLst/>
+          </a:prstGeom>
+        </p:spPr>
+        <p:style>
+          <a:lnRef idx="2">
+            <a:schemeClr val="dk1"/>
+          </a:lnRef>
+          <a:fillRef idx="1">
+            <a:schemeClr val="lt1"/>
+          </a:fillRef>
+          <a:effectRef idx="0">
+            <a:schemeClr val="dk1"/>
+          </a:effectRef>
+          <a:fontRef idx="minor">
+            <a:schemeClr val="dk1"/>
+          </a:fontRef>
+        </p:style>
+        <p:txBody>
+          <a:bodyPr rtlCol="0" anchor="ctr"/>
+          <a:lstStyle/>
+          <a:p>
+            <a:pPr algn="ctr"/>
+            <a:endParaRPr lang="pt-BR"/>
+          </a:p>
+        </p:txBody>
+      </p:sp>
+      <p:sp>
+        <p:nvSpPr>
+          <p:cNvPr id="24" name="CaixaDeTexto 23"/>
+          <p:cNvSpPr txBox="1"/>
+          <p:nvPr/>
+        </p:nvSpPr>
+        <p:spPr>
+          <a:xfrm>
+            <a:off x="1141673" y="3268573"/>
+            <a:ext cx="1487908" cy="369332"/>
+          </a:xfrm>
+          <a:prstGeom prst="rect">
+            <a:avLst/>
+          </a:prstGeom>
+          <a:noFill/>
+        </p:spPr>
+        <p:txBody>
+          <a:bodyPr wrap="none" rtlCol="0">
+            <a:spAutoFit/>
+          </a:bodyPr>
+          <a:lstStyle/>
+          <a:p>
             <a:r>
               <a:rPr lang="pt-BR" dirty="0" smtClean="0"/>
-              <a:t>Projeto</a:t>
-            </a:r>
-          </a:p>
-          <a:p>
-            <a:pPr lvl="1"/>
+              <a:t>Vencimento:</a:t>
+            </a:r>
+            <a:endParaRPr lang="pt-BR" dirty="0"/>
+          </a:p>
+        </p:txBody>
+      </p:sp>
+      <p:sp>
+        <p:nvSpPr>
+          <p:cNvPr id="9" name="CaixaDeTexto 8"/>
+          <p:cNvSpPr txBox="1"/>
+          <p:nvPr/>
+        </p:nvSpPr>
+        <p:spPr>
+          <a:xfrm>
+            <a:off x="971600" y="5589240"/>
+            <a:ext cx="4759636" cy="369332"/>
+          </a:xfrm>
+          <a:prstGeom prst="rect">
+            <a:avLst/>
+          </a:prstGeom>
+          <a:noFill/>
+        </p:spPr>
+        <p:txBody>
+          <a:bodyPr wrap="none" rtlCol="0">
+            <a:spAutoFit/>
+          </a:bodyPr>
+          <a:lstStyle/>
+          <a:p>
+            <a:r>
+              <a:rPr lang="pt-BR" b="1" dirty="0" smtClean="0"/>
+              <a:t>Data de criação </a:t>
+            </a:r>
             <a:r>
               <a:rPr lang="pt-BR" dirty="0" smtClean="0"/>
-              <a:t>Tarefa</a:t>
-            </a:r>
-          </a:p>
-          <a:p>
-            <a:pPr lvl="1"/>
+              <a:t>– automática quando cria.</a:t>
+            </a:r>
+            <a:endParaRPr lang="pt-BR" dirty="0"/>
+          </a:p>
+        </p:txBody>
+      </p:sp>
+      <p:sp>
+        <p:nvSpPr>
+          <p:cNvPr id="25" name="CaixaDeTexto 24"/>
+          <p:cNvSpPr txBox="1"/>
+          <p:nvPr/>
+        </p:nvSpPr>
+        <p:spPr>
+          <a:xfrm>
+            <a:off x="971600" y="5958572"/>
+            <a:ext cx="7271542" cy="369332"/>
+          </a:xfrm>
+          <a:prstGeom prst="rect">
+            <a:avLst/>
+          </a:prstGeom>
+          <a:noFill/>
+        </p:spPr>
+        <p:txBody>
+          <a:bodyPr wrap="none" rtlCol="0">
+            <a:spAutoFit/>
+          </a:bodyPr>
+          <a:lstStyle/>
+          <a:p>
+            <a:r>
+              <a:rPr lang="pt-BR" b="1" dirty="0" smtClean="0"/>
+              <a:t>Data de fechamento – </a:t>
+            </a:r>
             <a:r>
               <a:rPr lang="pt-BR" dirty="0" smtClean="0"/>
-              <a:t>Situação</a:t>
-            </a:r>
-            <a:endParaRPr lang="en-US" dirty="0"/>
+              <a:t>automática quando vai pra situação pronto.</a:t>
+            </a:r>
+            <a:endParaRPr lang="pt-BR" dirty="0"/>
+          </a:p>
+        </p:txBody>
+      </p:sp>
+      <p:sp>
+        <p:nvSpPr>
+          <p:cNvPr id="26" name="CaixaDeTexto 25"/>
+          <p:cNvSpPr txBox="1"/>
+          <p:nvPr/>
+        </p:nvSpPr>
+        <p:spPr>
+          <a:xfrm>
+            <a:off x="971600" y="6300028"/>
+            <a:ext cx="5960286" cy="369332"/>
+          </a:xfrm>
+          <a:prstGeom prst="rect">
+            <a:avLst/>
+          </a:prstGeom>
+          <a:noFill/>
+        </p:spPr>
+        <p:txBody>
+          <a:bodyPr wrap="none" rtlCol="0">
+            <a:spAutoFit/>
+          </a:bodyPr>
+          <a:lstStyle/>
+          <a:p>
+            <a:r>
+              <a:rPr lang="pt-BR" b="1" dirty="0" smtClean="0"/>
+              <a:t>Situação &lt;&gt; de fechado = </a:t>
+            </a:r>
+            <a:r>
+              <a:rPr lang="pt-BR" dirty="0" smtClean="0"/>
+              <a:t>data de fechamento é nula.</a:t>
+            </a:r>
+            <a:endParaRPr lang="pt-BR" dirty="0"/>
           </a:p>
         </p:txBody>
       </p:sp>
     </p:spTree>
+    <p:extLst>
+      <p:ext uri="{BB962C8B-B14F-4D97-AF65-F5344CB8AC3E}">
+        <p14:creationId xmlns:p14="http://schemas.microsoft.com/office/powerpoint/2010/main" val="1351672742"/>
+      </p:ext>
+    </p:extLst>
   </p:cSld>
   <p:clrMapOvr>
     <a:masterClrMapping/>
   </p:clrMapOvr>
-  <p:timing>
-    <p:tnLst>
-      <p:par>
-        <p:cTn id="1" dur="indefinite" restart="never" nodeType="tmRoot"/>
-      </p:par>
-    </p:tnLst>
-  </p:timing>
 </p:sld>
 </file>
 

</xml_diff>